<commit_message>
Update DG for Storage Component (#168)
* Update docs

* Add sequence diagram for Storage

* Update files
</commit_message>
<xml_diff>
--- a/docs/diagrams/StorageComponentClassDiagram.pptx
+++ b/docs/diagrams/StorageComponentClassDiagram.pptx
@@ -107,7 +107,444 @@
       </a:defRPr>
     </a:lvl9pPr>
   </p:defaultTextStyle>
+  <p:extLst>
+    <p:ext uri="{EFAFB233-063F-42B5-8137-9DF3F51BA10A}">
+      <p15:sldGuideLst xmlns:p15="http://schemas.microsoft.com/office/powerpoint/2012/main">
+        <p15:guide id="1" orient="horz" pos="1488">
+          <p15:clr>
+            <a:srgbClr val="A4A3A4"/>
+          </p15:clr>
+        </p15:guide>
+        <p15:guide id="2" pos="2880">
+          <p15:clr>
+            <a:srgbClr val="A4A3A4"/>
+          </p15:clr>
+        </p15:guide>
+      </p15:sldGuideLst>
+    </p:ext>
+  </p:extLst>
 </p:presentation>
+</file>
+
+<file path=ppt/revisionInfo.xml><?xml version="1.0" encoding="utf-8"?>
+<p1510:revInfo xmlns:a="http://schemas.openxmlformats.org/drawingml/2006/main" xmlns:r="http://schemas.openxmlformats.org/officeDocument/2006/relationships" xmlns:p1510="http://schemas.microsoft.com/office/powerpoint/2015/10/main">
+  <p1510:revLst>
+    <p1510:client id="{506C65B2-D229-1199-5B81-69A40BDAD3A6}" v="167" dt="2018-11-06T14:00:19.621"/>
+  </p1510:revLst>
+</p1510:revInfo>
+</file>
+
+<file path=ppt/changesInfos/changesInfo1.xml><?xml version="1.0" encoding="utf-8"?>
+<pc:chgInfo xmlns:a="http://schemas.openxmlformats.org/drawingml/2006/main" xmlns:r="http://schemas.openxmlformats.org/officeDocument/2006/relationships" xmlns:ac="http://schemas.microsoft.com/office/drawing/2013/main/command" xmlns:pc="http://schemas.microsoft.com/office/powerpoint/2013/main/command">
+  <pc:docChgLst>
+    <pc:chgData name="Julius Sander Nugroho" userId="S::e0175388@u.nus.edu::676b7903-60be-4a2c-9a21-bdd1db181a88" providerId="AD" clId="Web-{506C65B2-D229-1199-5B81-69A40BDAD3A6}"/>
+    <pc:docChg chg="modSld">
+      <pc:chgData name="Julius Sander Nugroho" userId="S::e0175388@u.nus.edu::676b7903-60be-4a2c-9a21-bdd1db181a88" providerId="AD" clId="Web-{506C65B2-D229-1199-5B81-69A40BDAD3A6}" dt="2018-11-06T14:02:15.995" v="303" actId="1076"/>
+      <pc:docMkLst>
+        <pc:docMk/>
+      </pc:docMkLst>
+      <pc:sldChg chg="addSp delSp modSp">
+        <pc:chgData name="Julius Sander Nugroho" userId="S::e0175388@u.nus.edu::676b7903-60be-4a2c-9a21-bdd1db181a88" providerId="AD" clId="Web-{506C65B2-D229-1199-5B81-69A40BDAD3A6}" dt="2018-11-06T14:02:15.995" v="303" actId="1076"/>
+        <pc:sldMkLst>
+          <pc:docMk/>
+          <pc:sldMk cId="1478832369" sldId="264"/>
+        </pc:sldMkLst>
+        <pc:spChg chg="mod">
+          <ac:chgData name="Julius Sander Nugroho" userId="S::e0175388@u.nus.edu::676b7903-60be-4a2c-9a21-bdd1db181a88" providerId="AD" clId="Web-{506C65B2-D229-1199-5B81-69A40BDAD3A6}" dt="2018-11-06T12:32:46.859" v="165" actId="20577"/>
+          <ac:spMkLst>
+            <pc:docMk/>
+            <pc:sldMk cId="1478832369" sldId="264"/>
+            <ac:spMk id="2" creationId="{00000000-0000-0000-0000-000000000000}"/>
+          </ac:spMkLst>
+        </pc:spChg>
+        <pc:spChg chg="mod">
+          <ac:chgData name="Julius Sander Nugroho" userId="S::e0175388@u.nus.edu::676b7903-60be-4a2c-9a21-bdd1db181a88" providerId="AD" clId="Web-{506C65B2-D229-1199-5B81-69A40BDAD3A6}" dt="2018-11-06T12:31:27.796" v="115" actId="14100"/>
+          <ac:spMkLst>
+            <pc:docMk/>
+            <pc:sldMk cId="1478832369" sldId="264"/>
+            <ac:spMk id="9" creationId="{00000000-0000-0000-0000-000000000000}"/>
+          </ac:spMkLst>
+        </pc:spChg>
+        <pc:spChg chg="add del">
+          <ac:chgData name="Julius Sander Nugroho" userId="S::e0175388@u.nus.edu::676b7903-60be-4a2c-9a21-bdd1db181a88" providerId="AD" clId="Web-{506C65B2-D229-1199-5B81-69A40BDAD3A6}" dt="2018-11-06T12:32:22.031" v="131"/>
+          <ac:spMkLst>
+            <pc:docMk/>
+            <pc:sldMk cId="1478832369" sldId="264"/>
+            <ac:spMk id="26" creationId="{5F120D53-280E-464D-B2BA-FFCB1504085F}"/>
+          </ac:spMkLst>
+        </pc:spChg>
+        <pc:spChg chg="add del">
+          <ac:chgData name="Julius Sander Nugroho" userId="S::e0175388@u.nus.edu::676b7903-60be-4a2c-9a21-bdd1db181a88" providerId="AD" clId="Web-{506C65B2-D229-1199-5B81-69A40BDAD3A6}" dt="2018-11-06T12:32:22.015" v="130"/>
+          <ac:spMkLst>
+            <pc:docMk/>
+            <pc:sldMk cId="1478832369" sldId="264"/>
+            <ac:spMk id="27" creationId="{AC751307-2F5A-4D1A-BF8D-8B1782601B10}"/>
+          </ac:spMkLst>
+        </pc:spChg>
+        <pc:spChg chg="add mod">
+          <ac:chgData name="Julius Sander Nugroho" userId="S::e0175388@u.nus.edu::676b7903-60be-4a2c-9a21-bdd1db181a88" providerId="AD" clId="Web-{506C65B2-D229-1199-5B81-69A40BDAD3A6}" dt="2018-11-06T13:55:23.324" v="208" actId="14100"/>
+          <ac:spMkLst>
+            <pc:docMk/>
+            <pc:sldMk cId="1478832369" sldId="264"/>
+            <ac:spMk id="29" creationId="{65952621-7961-4108-A51C-965A4A2A2421}"/>
+          </ac:spMkLst>
+        </pc:spChg>
+        <pc:spChg chg="add del">
+          <ac:chgData name="Julius Sander Nugroho" userId="S::e0175388@u.nus.edu::676b7903-60be-4a2c-9a21-bdd1db181a88" providerId="AD" clId="Web-{506C65B2-D229-1199-5B81-69A40BDAD3A6}" dt="2018-11-06T12:32:22.015" v="128"/>
+          <ac:spMkLst>
+            <pc:docMk/>
+            <pc:sldMk cId="1478832369" sldId="264"/>
+            <ac:spMk id="29" creationId="{7BC95A44-5F67-4B8A-81CC-DF58FD3CB850}"/>
+          </ac:spMkLst>
+        </pc:spChg>
+        <pc:spChg chg="add mod">
+          <ac:chgData name="Julius Sander Nugroho" userId="S::e0175388@u.nus.edu::676b7903-60be-4a2c-9a21-bdd1db181a88" providerId="AD" clId="Web-{506C65B2-D229-1199-5B81-69A40BDAD3A6}" dt="2018-11-06T12:32:52.468" v="169" actId="20577"/>
+          <ac:spMkLst>
+            <pc:docMk/>
+            <pc:sldMk cId="1478832369" sldId="264"/>
+            <ac:spMk id="30" creationId="{367C9AFE-2593-4350-A75D-FD9C44CB57B4}"/>
+          </ac:spMkLst>
+        </pc:spChg>
+        <pc:spChg chg="add mod">
+          <ac:chgData name="Julius Sander Nugroho" userId="S::e0175388@u.nus.edu::676b7903-60be-4a2c-9a21-bdd1db181a88" providerId="AD" clId="Web-{506C65B2-D229-1199-5B81-69A40BDAD3A6}" dt="2018-11-06T12:32:29.624" v="137" actId="1076"/>
+          <ac:spMkLst>
+            <pc:docMk/>
+            <pc:sldMk cId="1478832369" sldId="264"/>
+            <ac:spMk id="32" creationId="{3AC7F8A2-C75A-4DAD-8668-70C0EF3345E2}"/>
+          </ac:spMkLst>
+        </pc:spChg>
+        <pc:spChg chg="add mod">
+          <ac:chgData name="Julius Sander Nugroho" userId="S::e0175388@u.nus.edu::676b7903-60be-4a2c-9a21-bdd1db181a88" providerId="AD" clId="Web-{506C65B2-D229-1199-5B81-69A40BDAD3A6}" dt="2018-11-06T13:58:26.980" v="258" actId="14100"/>
+          <ac:spMkLst>
+            <pc:docMk/>
+            <pc:sldMk cId="1478832369" sldId="264"/>
+            <ac:spMk id="37" creationId="{9BCC6247-09D4-492F-9381-EF3ED4CA7E07}"/>
+          </ac:spMkLst>
+        </pc:spChg>
+        <pc:spChg chg="add mod">
+          <ac:chgData name="Julius Sander Nugroho" userId="S::e0175388@u.nus.edu::676b7903-60be-4a2c-9a21-bdd1db181a88" providerId="AD" clId="Web-{506C65B2-D229-1199-5B81-69A40BDAD3A6}" dt="2018-11-06T14:00:19.621" v="272" actId="14100"/>
+          <ac:spMkLst>
+            <pc:docMk/>
+            <pc:sldMk cId="1478832369" sldId="264"/>
+            <ac:spMk id="39" creationId="{F5D8B78D-0F72-4F43-B1B6-DBEAE8D8AA5A}"/>
+          </ac:spMkLst>
+        </pc:spChg>
+        <pc:spChg chg="add mod">
+          <ac:chgData name="Julius Sander Nugroho" userId="S::e0175388@u.nus.edu::676b7903-60be-4a2c-9a21-bdd1db181a88" providerId="AD" clId="Web-{506C65B2-D229-1199-5B81-69A40BDAD3A6}" dt="2018-11-06T14:00:57.620" v="282" actId="20577"/>
+          <ac:spMkLst>
+            <pc:docMk/>
+            <pc:sldMk cId="1478832369" sldId="264"/>
+            <ac:spMk id="40" creationId="{576AE358-3053-4B1D-BE33-5C5D1BA5E2D5}"/>
+          </ac:spMkLst>
+        </pc:spChg>
+        <pc:spChg chg="mod">
+          <ac:chgData name="Julius Sander Nugroho" userId="S::e0175388@u.nus.edu::676b7903-60be-4a2c-9a21-bdd1db181a88" providerId="AD" clId="Web-{506C65B2-D229-1199-5B81-69A40BDAD3A6}" dt="2018-11-06T12:31:22.546" v="99" actId="1076"/>
+          <ac:spMkLst>
+            <pc:docMk/>
+            <pc:sldMk cId="1478832369" sldId="264"/>
+            <ac:spMk id="42" creationId="{00000000-0000-0000-0000-000000000000}"/>
+          </ac:spMkLst>
+        </pc:spChg>
+        <pc:spChg chg="add mod">
+          <ac:chgData name="Julius Sander Nugroho" userId="S::e0175388@u.nus.edu::676b7903-60be-4a2c-9a21-bdd1db181a88" providerId="AD" clId="Web-{506C65B2-D229-1199-5B81-69A40BDAD3A6}" dt="2018-11-06T14:01:41.464" v="295" actId="14100"/>
+          <ac:spMkLst>
+            <pc:docMk/>
+            <pc:sldMk cId="1478832369" sldId="264"/>
+            <ac:spMk id="43" creationId="{C478C0FF-701D-481F-BD9F-C3FB74B2146F}"/>
+          </ac:spMkLst>
+        </pc:spChg>
+        <pc:spChg chg="add mod">
+          <ac:chgData name="Julius Sander Nugroho" userId="S::e0175388@u.nus.edu::676b7903-60be-4a2c-9a21-bdd1db181a88" providerId="AD" clId="Web-{506C65B2-D229-1199-5B81-69A40BDAD3A6}" dt="2018-11-06T14:02:09.120" v="302" actId="14100"/>
+          <ac:spMkLst>
+            <pc:docMk/>
+            <pc:sldMk cId="1478832369" sldId="264"/>
+            <ac:spMk id="45" creationId="{B4AB59F1-1B7E-4230-A54D-3F8BEC96BD4F}"/>
+          </ac:spMkLst>
+        </pc:spChg>
+        <pc:spChg chg="mod">
+          <ac:chgData name="Julius Sander Nugroho" userId="S::e0175388@u.nus.edu::676b7903-60be-4a2c-9a21-bdd1db181a88" providerId="AD" clId="Web-{506C65B2-D229-1199-5B81-69A40BDAD3A6}" dt="2018-11-06T13:54:06.653" v="179" actId="14100"/>
+          <ac:spMkLst>
+            <pc:docMk/>
+            <pc:sldMk cId="1478832369" sldId="264"/>
+            <ac:spMk id="50" creationId="{00000000-0000-0000-0000-000000000000}"/>
+          </ac:spMkLst>
+        </pc:spChg>
+        <pc:spChg chg="mod">
+          <ac:chgData name="Julius Sander Nugroho" userId="S::e0175388@u.nus.edu::676b7903-60be-4a2c-9a21-bdd1db181a88" providerId="AD" clId="Web-{506C65B2-D229-1199-5B81-69A40BDAD3A6}" dt="2018-11-06T12:31:22.608" v="104" actId="1076"/>
+          <ac:spMkLst>
+            <pc:docMk/>
+            <pc:sldMk cId="1478832369" sldId="264"/>
+            <ac:spMk id="52" creationId="{00000000-0000-0000-0000-000000000000}"/>
+          </ac:spMkLst>
+        </pc:spChg>
+        <pc:spChg chg="mod">
+          <ac:chgData name="Julius Sander Nugroho" userId="S::e0175388@u.nus.edu::676b7903-60be-4a2c-9a21-bdd1db181a88" providerId="AD" clId="Web-{506C65B2-D229-1199-5B81-69A40BDAD3A6}" dt="2018-11-06T12:31:42.687" v="118" actId="1076"/>
+          <ac:spMkLst>
+            <pc:docMk/>
+            <pc:sldMk cId="1478832369" sldId="264"/>
+            <ac:spMk id="56" creationId="{00000000-0000-0000-0000-000000000000}"/>
+          </ac:spMkLst>
+        </pc:spChg>
+        <pc:spChg chg="mod">
+          <ac:chgData name="Julius Sander Nugroho" userId="S::e0175388@u.nus.edu::676b7903-60be-4a2c-9a21-bdd1db181a88" providerId="AD" clId="Web-{506C65B2-D229-1199-5B81-69A40BDAD3A6}" dt="2018-11-06T12:31:22.671" v="108" actId="1076"/>
+          <ac:spMkLst>
+            <pc:docMk/>
+            <pc:sldMk cId="1478832369" sldId="264"/>
+            <ac:spMk id="61" creationId="{00000000-0000-0000-0000-000000000000}"/>
+          </ac:spMkLst>
+        </pc:spChg>
+        <pc:spChg chg="mod">
+          <ac:chgData name="Julius Sander Nugroho" userId="S::e0175388@u.nus.edu::676b7903-60be-4a2c-9a21-bdd1db181a88" providerId="AD" clId="Web-{506C65B2-D229-1199-5B81-69A40BDAD3A6}" dt="2018-11-06T12:31:22.671" v="109" actId="1076"/>
+          <ac:spMkLst>
+            <pc:docMk/>
+            <pc:sldMk cId="1478832369" sldId="264"/>
+            <ac:spMk id="65" creationId="{00000000-0000-0000-0000-000000000000}"/>
+          </ac:spMkLst>
+        </pc:spChg>
+        <pc:spChg chg="mod">
+          <ac:chgData name="Julius Sander Nugroho" userId="S::e0175388@u.nus.edu::676b7903-60be-4a2c-9a21-bdd1db181a88" providerId="AD" clId="Web-{506C65B2-D229-1199-5B81-69A40BDAD3A6}" dt="2018-11-06T13:54:16.746" v="183" actId="14100"/>
+          <ac:spMkLst>
+            <pc:docMk/>
+            <pc:sldMk cId="1478832369" sldId="264"/>
+            <ac:spMk id="66" creationId="{00000000-0000-0000-0000-000000000000}"/>
+          </ac:spMkLst>
+        </pc:spChg>
+        <pc:spChg chg="mod">
+          <ac:chgData name="Julius Sander Nugroho" userId="S::e0175388@u.nus.edu::676b7903-60be-4a2c-9a21-bdd1db181a88" providerId="AD" clId="Web-{506C65B2-D229-1199-5B81-69A40BDAD3A6}" dt="2018-11-06T13:56:05.027" v="223" actId="20577"/>
+          <ac:spMkLst>
+            <pc:docMk/>
+            <pc:sldMk cId="1478832369" sldId="264"/>
+            <ac:spMk id="73" creationId="{00000000-0000-0000-0000-000000000000}"/>
+          </ac:spMkLst>
+        </pc:spChg>
+        <pc:spChg chg="mod">
+          <ac:chgData name="Julius Sander Nugroho" userId="S::e0175388@u.nus.edu::676b7903-60be-4a2c-9a21-bdd1db181a88" providerId="AD" clId="Web-{506C65B2-D229-1199-5B81-69A40BDAD3A6}" dt="2018-11-06T13:55:09.777" v="199" actId="14100"/>
+          <ac:spMkLst>
+            <pc:docMk/>
+            <pc:sldMk cId="1478832369" sldId="264"/>
+            <ac:spMk id="74" creationId="{00000000-0000-0000-0000-000000000000}"/>
+          </ac:spMkLst>
+        </pc:spChg>
+        <pc:spChg chg="mod">
+          <ac:chgData name="Julius Sander Nugroho" userId="S::e0175388@u.nus.edu::676b7903-60be-4a2c-9a21-bdd1db181a88" providerId="AD" clId="Web-{506C65B2-D229-1199-5B81-69A40BDAD3A6}" dt="2018-11-06T12:31:22.561" v="101" actId="1076"/>
+          <ac:spMkLst>
+            <pc:docMk/>
+            <pc:sldMk cId="1478832369" sldId="264"/>
+            <ac:spMk id="99" creationId="{00000000-0000-0000-0000-000000000000}"/>
+          </ac:spMkLst>
+        </pc:spChg>
+        <pc:cxnChg chg="add del mod">
+          <ac:chgData name="Julius Sander Nugroho" userId="S::e0175388@u.nus.edu::676b7903-60be-4a2c-9a21-bdd1db181a88" providerId="AD" clId="Web-{506C65B2-D229-1199-5B81-69A40BDAD3A6}" dt="2018-11-06T13:56:53.308" v="235"/>
+          <ac:cxnSpMkLst>
+            <pc:docMk/>
+            <pc:sldMk cId="1478832369" sldId="264"/>
+            <ac:cxnSpMk id="3" creationId="{125A03B0-AD6D-42BD-8357-117D073CF2C1}"/>
+          </ac:cxnSpMkLst>
+        </pc:cxnChg>
+        <pc:cxnChg chg="add mod">
+          <ac:chgData name="Julius Sander Nugroho" userId="S::e0175388@u.nus.edu::676b7903-60be-4a2c-9a21-bdd1db181a88" providerId="AD" clId="Web-{506C65B2-D229-1199-5B81-69A40BDAD3A6}" dt="2018-11-06T13:57:47.965" v="247"/>
+          <ac:cxnSpMkLst>
+            <pc:docMk/>
+            <pc:sldMk cId="1478832369" sldId="264"/>
+            <ac:cxnSpMk id="4" creationId="{ABDDF4CA-3DD3-4FE3-BD1F-8822DEF8AC69}"/>
+          </ac:cxnSpMkLst>
+        </pc:cxnChg>
+        <pc:cxnChg chg="add del mod">
+          <ac:chgData name="Julius Sander Nugroho" userId="S::e0175388@u.nus.edu::676b7903-60be-4a2c-9a21-bdd1db181a88" providerId="AD" clId="Web-{506C65B2-D229-1199-5B81-69A40BDAD3A6}" dt="2018-11-06T12:32:22.015" v="129"/>
+          <ac:cxnSpMkLst>
+            <pc:docMk/>
+            <pc:sldMk cId="1478832369" sldId="264"/>
+            <ac:cxnSpMk id="28" creationId="{0016E45A-65D4-4A69-BC32-F6FFF238ABAC}"/>
+          </ac:cxnSpMkLst>
+        </pc:cxnChg>
+        <pc:cxnChg chg="add mod">
+          <ac:chgData name="Julius Sander Nugroho" userId="S::e0175388@u.nus.edu::676b7903-60be-4a2c-9a21-bdd1db181a88" providerId="AD" clId="Web-{506C65B2-D229-1199-5B81-69A40BDAD3A6}" dt="2018-11-06T12:32:29.609" v="136" actId="1076"/>
+          <ac:cxnSpMkLst>
+            <pc:docMk/>
+            <pc:sldMk cId="1478832369" sldId="264"/>
+            <ac:cxnSpMk id="31" creationId="{8B424672-92AB-4578-AF40-C151F7A5AB3B}"/>
+          </ac:cxnSpMkLst>
+        </pc:cxnChg>
+        <pc:cxnChg chg="add mod">
+          <ac:chgData name="Julius Sander Nugroho" userId="S::e0175388@u.nus.edu::676b7903-60be-4a2c-9a21-bdd1db181a88" providerId="AD" clId="Web-{506C65B2-D229-1199-5B81-69A40BDAD3A6}" dt="2018-11-06T13:54:39.715" v="190" actId="1076"/>
+          <ac:cxnSpMkLst>
+            <pc:docMk/>
+            <pc:sldMk cId="1478832369" sldId="264"/>
+            <ac:cxnSpMk id="33" creationId="{CDE5FCE6-868C-4377-B9ED-6A9C210DBD53}"/>
+          </ac:cxnSpMkLst>
+        </pc:cxnChg>
+        <pc:cxnChg chg="add del mod">
+          <ac:chgData name="Julius Sander Nugroho" userId="S::e0175388@u.nus.edu::676b7903-60be-4a2c-9a21-bdd1db181a88" providerId="AD" clId="Web-{506C65B2-D229-1199-5B81-69A40BDAD3A6}" dt="2018-11-06T13:56:19.605" v="229"/>
+          <ac:cxnSpMkLst>
+            <pc:docMk/>
+            <pc:sldMk cId="1478832369" sldId="264"/>
+            <ac:cxnSpMk id="34" creationId="{A0412036-F3B9-4A31-9E16-130945A1F12F}"/>
+          </ac:cxnSpMkLst>
+        </pc:cxnChg>
+        <pc:cxnChg chg="add del mod">
+          <ac:chgData name="Julius Sander Nugroho" userId="S::e0175388@u.nus.edu::676b7903-60be-4a2c-9a21-bdd1db181a88" providerId="AD" clId="Web-{506C65B2-D229-1199-5B81-69A40BDAD3A6}" dt="2018-11-06T13:57:17.808" v="241"/>
+          <ac:cxnSpMkLst>
+            <pc:docMk/>
+            <pc:sldMk cId="1478832369" sldId="264"/>
+            <ac:cxnSpMk id="35" creationId="{C217ADA4-B9ED-426D-AC53-70CB66F3E35F}"/>
+          </ac:cxnSpMkLst>
+        </pc:cxnChg>
+        <pc:cxnChg chg="add mod">
+          <ac:chgData name="Julius Sander Nugroho" userId="S::e0175388@u.nus.edu::676b7903-60be-4a2c-9a21-bdd1db181a88" providerId="AD" clId="Web-{506C65B2-D229-1199-5B81-69A40BDAD3A6}" dt="2018-11-06T13:58:03.949" v="250" actId="14100"/>
+          <ac:cxnSpMkLst>
+            <pc:docMk/>
+            <pc:sldMk cId="1478832369" sldId="264"/>
+            <ac:cxnSpMk id="36" creationId="{38899B10-78D3-4919-B1B3-EE1EEA925BB3}"/>
+          </ac:cxnSpMkLst>
+        </pc:cxnChg>
+        <pc:cxnChg chg="add mod">
+          <ac:chgData name="Julius Sander Nugroho" userId="S::e0175388@u.nus.edu::676b7903-60be-4a2c-9a21-bdd1db181a88" providerId="AD" clId="Web-{506C65B2-D229-1199-5B81-69A40BDAD3A6}" dt="2018-11-06T14:00:19.621" v="271" actId="14100"/>
+          <ac:cxnSpMkLst>
+            <pc:docMk/>
+            <pc:sldMk cId="1478832369" sldId="264"/>
+            <ac:cxnSpMk id="38" creationId="{C06590A8-159F-4C4A-B129-4A84B624FC6B}"/>
+          </ac:cxnSpMkLst>
+        </pc:cxnChg>
+        <pc:cxnChg chg="add mod">
+          <ac:chgData name="Julius Sander Nugroho" userId="S::e0175388@u.nus.edu::676b7903-60be-4a2c-9a21-bdd1db181a88" providerId="AD" clId="Web-{506C65B2-D229-1199-5B81-69A40BDAD3A6}" dt="2018-11-06T14:01:10.980" v="289" actId="14100"/>
+          <ac:cxnSpMkLst>
+            <pc:docMk/>
+            <pc:sldMk cId="1478832369" sldId="264"/>
+            <ac:cxnSpMk id="41" creationId="{9662CE0B-162C-4FA9-A6F7-5D08F1238F35}"/>
+          </ac:cxnSpMkLst>
+        </pc:cxnChg>
+        <pc:cxnChg chg="add mod">
+          <ac:chgData name="Julius Sander Nugroho" userId="S::e0175388@u.nus.edu::676b7903-60be-4a2c-9a21-bdd1db181a88" providerId="AD" clId="Web-{506C65B2-D229-1199-5B81-69A40BDAD3A6}" dt="2018-11-06T14:02:15.995" v="303" actId="1076"/>
+          <ac:cxnSpMkLst>
+            <pc:docMk/>
+            <pc:sldMk cId="1478832369" sldId="264"/>
+            <ac:cxnSpMk id="44" creationId="{83D16E50-278D-4DA5-AB23-236A3FE4EF4E}"/>
+          </ac:cxnSpMkLst>
+        </pc:cxnChg>
+        <pc:cxnChg chg="mod">
+          <ac:chgData name="Julius Sander Nugroho" userId="S::e0175388@u.nus.edu::676b7903-60be-4a2c-9a21-bdd1db181a88" providerId="AD" clId="Web-{506C65B2-D229-1199-5B81-69A40BDAD3A6}" dt="2018-11-06T12:31:59.812" v="121" actId="14100"/>
+          <ac:cxnSpMkLst>
+            <pc:docMk/>
+            <pc:sldMk cId="1478832369" sldId="264"/>
+            <ac:cxnSpMk id="54" creationId="{00000000-0000-0000-0000-000000000000}"/>
+          </ac:cxnSpMkLst>
+        </pc:cxnChg>
+        <pc:cxnChg chg="mod">
+          <ac:chgData name="Julius Sander Nugroho" userId="S::e0175388@u.nus.edu::676b7903-60be-4a2c-9a21-bdd1db181a88" providerId="AD" clId="Web-{506C65B2-D229-1199-5B81-69A40BDAD3A6}" dt="2018-11-06T12:32:09.687" v="123" actId="14100"/>
+          <ac:cxnSpMkLst>
+            <pc:docMk/>
+            <pc:sldMk cId="1478832369" sldId="264"/>
+            <ac:cxnSpMk id="58" creationId="{00000000-0000-0000-0000-000000000000}"/>
+          </ac:cxnSpMkLst>
+        </pc:cxnChg>
+        <pc:cxnChg chg="mod">
+          <ac:chgData name="Julius Sander Nugroho" userId="S::e0175388@u.nus.edu::676b7903-60be-4a2c-9a21-bdd1db181a88" providerId="AD" clId="Web-{506C65B2-D229-1199-5B81-69A40BDAD3A6}" dt="2018-11-06T12:31:22.655" v="107" actId="1076"/>
+          <ac:cxnSpMkLst>
+            <pc:docMk/>
+            <pc:sldMk cId="1478832369" sldId="264"/>
+            <ac:cxnSpMk id="60" creationId="{00000000-0000-0000-0000-000000000000}"/>
+          </ac:cxnSpMkLst>
+        </pc:cxnChg>
+        <pc:cxnChg chg="del mod">
+          <ac:chgData name="Julius Sander Nugroho" userId="S::e0175388@u.nus.edu::676b7903-60be-4a2c-9a21-bdd1db181a88" providerId="AD" clId="Web-{506C65B2-D229-1199-5B81-69A40BDAD3A6}" dt="2018-11-06T13:56:10.184" v="225"/>
+          <ac:cxnSpMkLst>
+            <pc:docMk/>
+            <pc:sldMk cId="1478832369" sldId="264"/>
+            <ac:cxnSpMk id="70" creationId="{00000000-0000-0000-0000-000000000000}"/>
+          </ac:cxnSpMkLst>
+        </pc:cxnChg>
+        <pc:cxnChg chg="mod">
+          <ac:chgData name="Julius Sander Nugroho" userId="S::e0175388@u.nus.edu::676b7903-60be-4a2c-9a21-bdd1db181a88" providerId="AD" clId="Web-{506C65B2-D229-1199-5B81-69A40BDAD3A6}" dt="2018-11-06T13:54:45.309" v="192" actId="1076"/>
+          <ac:cxnSpMkLst>
+            <pc:docMk/>
+            <pc:sldMk cId="1478832369" sldId="264"/>
+            <ac:cxnSpMk id="77" creationId="{00000000-0000-0000-0000-000000000000}"/>
+          </ac:cxnSpMkLst>
+        </pc:cxnChg>
+        <pc:cxnChg chg="mod">
+          <ac:chgData name="Julius Sander Nugroho" userId="S::e0175388@u.nus.edu::676b7903-60be-4a2c-9a21-bdd1db181a88" providerId="AD" clId="Web-{506C65B2-D229-1199-5B81-69A40BDAD3A6}" dt="2018-11-06T12:31:22.546" v="100" actId="1076"/>
+          <ac:cxnSpMkLst>
+            <pc:docMk/>
+            <pc:sldMk cId="1478832369" sldId="264"/>
+            <ac:cxnSpMk id="97" creationId="{00000000-0000-0000-0000-000000000000}"/>
+          </ac:cxnSpMkLst>
+        </pc:cxnChg>
+        <pc:cxnChg chg="mod">
+          <ac:chgData name="Julius Sander Nugroho" userId="S::e0175388@u.nus.edu::676b7903-60be-4a2c-9a21-bdd1db181a88" providerId="AD" clId="Web-{506C65B2-D229-1199-5B81-69A40BDAD3A6}" dt="2018-11-06T13:54:16.731" v="182" actId="14100"/>
+          <ac:cxnSpMkLst>
+            <pc:docMk/>
+            <pc:sldMk cId="1478832369" sldId="264"/>
+            <ac:cxnSpMk id="124" creationId="{00000000-0000-0000-0000-000000000000}"/>
+          </ac:cxnSpMkLst>
+        </pc:cxnChg>
+      </pc:sldChg>
+    </pc:docChg>
+  </pc:docChgLst>
+  <pc:docChgLst>
+    <pc:chgData name="Julius Sander Nugroho" userId="S::e0175388@u.nus.edu::676b7903-60be-4a2c-9a21-bdd1db181a88" providerId="AD" clId="Web-{9AA800CF-98FF-ACE9-65B1-714106EC9156}"/>
+    <pc:docChg chg="modSld">
+      <pc:chgData name="Julius Sander Nugroho" userId="S::e0175388@u.nus.edu::676b7903-60be-4a2c-9a21-bdd1db181a88" providerId="AD" clId="Web-{9AA800CF-98FF-ACE9-65B1-714106EC9156}" dt="2018-11-06T12:25:59.430" v="8" actId="1076"/>
+      <pc:docMkLst>
+        <pc:docMk/>
+      </pc:docMkLst>
+      <pc:sldChg chg="modSp">
+        <pc:chgData name="Julius Sander Nugroho" userId="S::e0175388@u.nus.edu::676b7903-60be-4a2c-9a21-bdd1db181a88" providerId="AD" clId="Web-{9AA800CF-98FF-ACE9-65B1-714106EC9156}" dt="2018-11-06T12:25:59.430" v="8" actId="1076"/>
+        <pc:sldMkLst>
+          <pc:docMk/>
+          <pc:sldMk cId="1478832369" sldId="264"/>
+        </pc:sldMkLst>
+        <pc:spChg chg="mod">
+          <ac:chgData name="Julius Sander Nugroho" userId="S::e0175388@u.nus.edu::676b7903-60be-4a2c-9a21-bdd1db181a88" providerId="AD" clId="Web-{9AA800CF-98FF-ACE9-65B1-714106EC9156}" dt="2018-11-06T12:25:59.398" v="6" actId="1076"/>
+          <ac:spMkLst>
+            <pc:docMk/>
+            <pc:sldMk cId="1478832369" sldId="264"/>
+            <ac:spMk id="9" creationId="{00000000-0000-0000-0000-000000000000}"/>
+          </ac:spMkLst>
+        </pc:spChg>
+        <pc:spChg chg="mod">
+          <ac:chgData name="Julius Sander Nugroho" userId="S::e0175388@u.nus.edu::676b7903-60be-4a2c-9a21-bdd1db181a88" providerId="AD" clId="Web-{9AA800CF-98FF-ACE9-65B1-714106EC9156}" dt="2018-11-06T12:25:37.429" v="0" actId="14100"/>
+          <ac:spMkLst>
+            <pc:docMk/>
+            <pc:sldMk cId="1478832369" sldId="264"/>
+            <ac:spMk id="118" creationId="{00000000-0000-0000-0000-000000000000}"/>
+          </ac:spMkLst>
+        </pc:spChg>
+        <pc:spChg chg="mod">
+          <ac:chgData name="Julius Sander Nugroho" userId="S::e0175388@u.nus.edu::676b7903-60be-4a2c-9a21-bdd1db181a88" providerId="AD" clId="Web-{9AA800CF-98FF-ACE9-65B1-714106EC9156}" dt="2018-11-06T12:25:42.086" v="1" actId="14100"/>
+          <ac:spMkLst>
+            <pc:docMk/>
+            <pc:sldMk cId="1478832369" sldId="264"/>
+            <ac:spMk id="119" creationId="{00000000-0000-0000-0000-000000000000}"/>
+          </ac:spMkLst>
+        </pc:spChg>
+        <pc:spChg chg="mod">
+          <ac:chgData name="Julius Sander Nugroho" userId="S::e0175388@u.nus.edu::676b7903-60be-4a2c-9a21-bdd1db181a88" providerId="AD" clId="Web-{9AA800CF-98FF-ACE9-65B1-714106EC9156}" dt="2018-11-06T12:25:59.414" v="7" actId="1076"/>
+          <ac:spMkLst>
+            <pc:docMk/>
+            <pc:sldMk cId="1478832369" sldId="264"/>
+            <ac:spMk id="120" creationId="{00000000-0000-0000-0000-000000000000}"/>
+          </ac:spMkLst>
+        </pc:spChg>
+        <pc:cxnChg chg="mod">
+          <ac:chgData name="Julius Sander Nugroho" userId="S::e0175388@u.nus.edu::676b7903-60be-4a2c-9a21-bdd1db181a88" providerId="AD" clId="Web-{9AA800CF-98FF-ACE9-65B1-714106EC9156}" dt="2018-11-06T12:25:59.430" v="8" actId="1076"/>
+          <ac:cxnSpMkLst>
+            <pc:docMk/>
+            <pc:sldMk cId="1478832369" sldId="264"/>
+            <ac:cxnSpMk id="21" creationId="{00000000-0000-0000-0000-000000000000}"/>
+          </ac:cxnSpMkLst>
+        </pc:cxnChg>
+        <pc:cxnChg chg="mod">
+          <ac:chgData name="Julius Sander Nugroho" userId="S::e0175388@u.nus.edu::676b7903-60be-4a2c-9a21-bdd1db181a88" providerId="AD" clId="Web-{9AA800CF-98FF-ACE9-65B1-714106EC9156}" dt="2018-11-06T12:25:50.258" v="2" actId="1076"/>
+          <ac:cxnSpMkLst>
+            <pc:docMk/>
+            <pc:sldMk cId="1478832369" sldId="264"/>
+            <ac:cxnSpMk id="75" creationId="{00000000-0000-0000-0000-000000000000}"/>
+          </ac:cxnSpMkLst>
+        </pc:cxnChg>
+      </pc:sldChg>
+    </pc:docChg>
+  </pc:docChgLst>
+</pc:chgInfo>
 </file>
 
 <file path=ppt/notesMasters/notesMaster1.xml><?xml version="1.0" encoding="utf-8"?>
@@ -192,7 +629,7 @@
           <a:p>
             <a:fld id="{F5CC4B3F-88C1-4FFA-B1B6-F41C21DC6924}" type="datetimeFigureOut">
               <a:rPr lang="en-US" smtClean="0"/>
-              <a:t>10/16/2016</a:t>
+              <a:t>11/6/2018</a:t>
             </a:fld>
             <a:endParaRPr lang="en-US"/>
           </a:p>
@@ -256,38 +693,37 @@
           <a:p>
             <a:pPr lvl="0"/>
             <a:r>
-              <a:rPr lang="en-US" smtClean="0"/>
+              <a:rPr lang="en-US"/>
               <a:t>Click to edit Master text styles</a:t>
             </a:r>
           </a:p>
           <a:p>
             <a:pPr lvl="1"/>
             <a:r>
-              <a:rPr lang="en-US" smtClean="0"/>
+              <a:rPr lang="en-US"/>
               <a:t>Second level</a:t>
             </a:r>
           </a:p>
           <a:p>
             <a:pPr lvl="2"/>
             <a:r>
-              <a:rPr lang="en-US" smtClean="0"/>
+              <a:rPr lang="en-US"/>
               <a:t>Third level</a:t>
             </a:r>
           </a:p>
           <a:p>
             <a:pPr lvl="3"/>
             <a:r>
-              <a:rPr lang="en-US" smtClean="0"/>
+              <a:rPr lang="en-US"/>
               <a:t>Fourth level</a:t>
             </a:r>
           </a:p>
           <a:p>
             <a:pPr lvl="4"/>
             <a:r>
-              <a:rPr lang="en-US" smtClean="0"/>
+              <a:rPr lang="en-US"/>
               <a:t>Fifth level</a:t>
             </a:r>
-            <a:endParaRPr lang="en-US"/>
           </a:p>
         </p:txBody>
       </p:sp>
@@ -498,10 +934,9 @@
           <a:lstStyle/>
           <a:p>
             <a:r>
-              <a:rPr lang="en-US" smtClean="0"/>
+              <a:rPr lang="en-US"/>
               <a:t>Click to edit Master title style</a:t>
             </a:r>
-            <a:endParaRPr lang="en-US"/>
           </a:p>
         </p:txBody>
       </p:sp>
@@ -617,10 +1052,9 @@
           </a:lstStyle>
           <a:p>
             <a:r>
-              <a:rPr lang="en-US" smtClean="0"/>
+              <a:rPr lang="en-US"/>
               <a:t>Click to edit Master subtitle style</a:t>
             </a:r>
-            <a:endParaRPr lang="en-US"/>
           </a:p>
         </p:txBody>
       </p:sp>
@@ -641,7 +1075,7 @@
           <a:p>
             <a:fld id="{78C97017-6FC3-485B-9764-EAC9E56C1D49}" type="datetimeFigureOut">
               <a:rPr lang="en-US" smtClean="0"/>
-              <a:t>10/16/2016</a:t>
+              <a:t>11/6/2018</a:t>
             </a:fld>
             <a:endParaRPr lang="en-US"/>
           </a:p>
@@ -735,10 +1169,9 @@
           <a:lstStyle/>
           <a:p>
             <a:r>
-              <a:rPr lang="en-US" smtClean="0"/>
+              <a:rPr lang="en-US"/>
               <a:t>Click to edit Master title style</a:t>
             </a:r>
-            <a:endParaRPr lang="en-US"/>
           </a:p>
         </p:txBody>
       </p:sp>
@@ -759,38 +1192,37 @@
           <a:p>
             <a:pPr lvl="0"/>
             <a:r>
-              <a:rPr lang="en-US" smtClean="0"/>
+              <a:rPr lang="en-US"/>
               <a:t>Click to edit Master text styles</a:t>
             </a:r>
           </a:p>
           <a:p>
             <a:pPr lvl="1"/>
             <a:r>
-              <a:rPr lang="en-US" smtClean="0"/>
+              <a:rPr lang="en-US"/>
               <a:t>Second level</a:t>
             </a:r>
           </a:p>
           <a:p>
             <a:pPr lvl="2"/>
             <a:r>
-              <a:rPr lang="en-US" smtClean="0"/>
+              <a:rPr lang="en-US"/>
               <a:t>Third level</a:t>
             </a:r>
           </a:p>
           <a:p>
             <a:pPr lvl="3"/>
             <a:r>
-              <a:rPr lang="en-US" smtClean="0"/>
+              <a:rPr lang="en-US"/>
               <a:t>Fourth level</a:t>
             </a:r>
           </a:p>
           <a:p>
             <a:pPr lvl="4"/>
             <a:r>
-              <a:rPr lang="en-US" smtClean="0"/>
+              <a:rPr lang="en-US"/>
               <a:t>Fifth level</a:t>
             </a:r>
-            <a:endParaRPr lang="en-US"/>
           </a:p>
         </p:txBody>
       </p:sp>
@@ -811,7 +1243,7 @@
           <a:p>
             <a:fld id="{78C97017-6FC3-485B-9764-EAC9E56C1D49}" type="datetimeFigureOut">
               <a:rPr lang="en-US" smtClean="0"/>
-              <a:t>10/16/2016</a:t>
+              <a:t>11/6/2018</a:t>
             </a:fld>
             <a:endParaRPr lang="en-US"/>
           </a:p>
@@ -910,10 +1342,9 @@
           <a:lstStyle/>
           <a:p>
             <a:r>
-              <a:rPr lang="en-US" smtClean="0"/>
+              <a:rPr lang="en-US"/>
               <a:t>Click to edit Master title style</a:t>
             </a:r>
-            <a:endParaRPr lang="en-US"/>
           </a:p>
         </p:txBody>
       </p:sp>
@@ -939,38 +1370,37 @@
           <a:p>
             <a:pPr lvl="0"/>
             <a:r>
-              <a:rPr lang="en-US" smtClean="0"/>
+              <a:rPr lang="en-US"/>
               <a:t>Click to edit Master text styles</a:t>
             </a:r>
           </a:p>
           <a:p>
             <a:pPr lvl="1"/>
             <a:r>
-              <a:rPr lang="en-US" smtClean="0"/>
+              <a:rPr lang="en-US"/>
               <a:t>Second level</a:t>
             </a:r>
           </a:p>
           <a:p>
             <a:pPr lvl="2"/>
             <a:r>
-              <a:rPr lang="en-US" smtClean="0"/>
+              <a:rPr lang="en-US"/>
               <a:t>Third level</a:t>
             </a:r>
           </a:p>
           <a:p>
             <a:pPr lvl="3"/>
             <a:r>
-              <a:rPr lang="en-US" smtClean="0"/>
+              <a:rPr lang="en-US"/>
               <a:t>Fourth level</a:t>
             </a:r>
           </a:p>
           <a:p>
             <a:pPr lvl="4"/>
             <a:r>
-              <a:rPr lang="en-US" smtClean="0"/>
+              <a:rPr lang="en-US"/>
               <a:t>Fifth level</a:t>
             </a:r>
-            <a:endParaRPr lang="en-US"/>
           </a:p>
         </p:txBody>
       </p:sp>
@@ -991,7 +1421,7 @@
           <a:p>
             <a:fld id="{78C97017-6FC3-485B-9764-EAC9E56C1D49}" type="datetimeFigureOut">
               <a:rPr lang="en-US" smtClean="0"/>
-              <a:t>10/16/2016</a:t>
+              <a:t>11/6/2018</a:t>
             </a:fld>
             <a:endParaRPr lang="en-US"/>
           </a:p>
@@ -1085,10 +1515,9 @@
           <a:lstStyle/>
           <a:p>
             <a:r>
-              <a:rPr lang="en-US" smtClean="0"/>
+              <a:rPr lang="en-US"/>
               <a:t>Click to edit Master title style</a:t>
             </a:r>
-            <a:endParaRPr lang="en-US"/>
           </a:p>
         </p:txBody>
       </p:sp>
@@ -1109,38 +1538,37 @@
           <a:p>
             <a:pPr lvl="0"/>
             <a:r>
-              <a:rPr lang="en-US" smtClean="0"/>
+              <a:rPr lang="en-US"/>
               <a:t>Click to edit Master text styles</a:t>
             </a:r>
           </a:p>
           <a:p>
             <a:pPr lvl="1"/>
             <a:r>
-              <a:rPr lang="en-US" smtClean="0"/>
+              <a:rPr lang="en-US"/>
               <a:t>Second level</a:t>
             </a:r>
           </a:p>
           <a:p>
             <a:pPr lvl="2"/>
             <a:r>
-              <a:rPr lang="en-US" smtClean="0"/>
+              <a:rPr lang="en-US"/>
               <a:t>Third level</a:t>
             </a:r>
           </a:p>
           <a:p>
             <a:pPr lvl="3"/>
             <a:r>
-              <a:rPr lang="en-US" smtClean="0"/>
+              <a:rPr lang="en-US"/>
               <a:t>Fourth level</a:t>
             </a:r>
           </a:p>
           <a:p>
             <a:pPr lvl="4"/>
             <a:r>
-              <a:rPr lang="en-US" smtClean="0"/>
+              <a:rPr lang="en-US"/>
               <a:t>Fifth level</a:t>
             </a:r>
-            <a:endParaRPr lang="en-US"/>
           </a:p>
         </p:txBody>
       </p:sp>
@@ -1161,7 +1589,7 @@
           <a:p>
             <a:fld id="{78C97017-6FC3-485B-9764-EAC9E56C1D49}" type="datetimeFigureOut">
               <a:rPr lang="en-US" smtClean="0"/>
-              <a:t>10/16/2016</a:t>
+              <a:t>11/6/2018</a:t>
             </a:fld>
             <a:endParaRPr lang="en-US"/>
           </a:p>
@@ -1264,10 +1692,9 @@
           </a:lstStyle>
           <a:p>
             <a:r>
-              <a:rPr lang="en-US" smtClean="0"/>
+              <a:rPr lang="en-US"/>
               <a:t>Click to edit Master title style</a:t>
             </a:r>
-            <a:endParaRPr lang="en-US"/>
           </a:p>
         </p:txBody>
       </p:sp>
@@ -1384,7 +1811,7 @@
           <a:p>
             <a:pPr lvl="0"/>
             <a:r>
-              <a:rPr lang="en-US" smtClean="0"/>
+              <a:rPr lang="en-US"/>
               <a:t>Click to edit Master text styles</a:t>
             </a:r>
           </a:p>
@@ -1407,7 +1834,7 @@
           <a:p>
             <a:fld id="{78C97017-6FC3-485B-9764-EAC9E56C1D49}" type="datetimeFigureOut">
               <a:rPr lang="en-US" smtClean="0"/>
-              <a:t>10/16/2016</a:t>
+              <a:t>11/6/2018</a:t>
             </a:fld>
             <a:endParaRPr lang="en-US"/>
           </a:p>
@@ -1501,10 +1928,9 @@
           <a:lstStyle/>
           <a:p>
             <a:r>
-              <a:rPr lang="en-US" smtClean="0"/>
+              <a:rPr lang="en-US"/>
               <a:t>Click to edit Master title style</a:t>
             </a:r>
-            <a:endParaRPr lang="en-US"/>
           </a:p>
         </p:txBody>
       </p:sp>
@@ -1558,38 +1984,37 @@
           <a:p>
             <a:pPr lvl="0"/>
             <a:r>
-              <a:rPr lang="en-US" smtClean="0"/>
+              <a:rPr lang="en-US"/>
               <a:t>Click to edit Master text styles</a:t>
             </a:r>
           </a:p>
           <a:p>
             <a:pPr lvl="1"/>
             <a:r>
-              <a:rPr lang="en-US" smtClean="0"/>
+              <a:rPr lang="en-US"/>
               <a:t>Second level</a:t>
             </a:r>
           </a:p>
           <a:p>
             <a:pPr lvl="2"/>
             <a:r>
-              <a:rPr lang="en-US" smtClean="0"/>
+              <a:rPr lang="en-US"/>
               <a:t>Third level</a:t>
             </a:r>
           </a:p>
           <a:p>
             <a:pPr lvl="3"/>
             <a:r>
-              <a:rPr lang="en-US" smtClean="0"/>
+              <a:rPr lang="en-US"/>
               <a:t>Fourth level</a:t>
             </a:r>
           </a:p>
           <a:p>
             <a:pPr lvl="4"/>
             <a:r>
-              <a:rPr lang="en-US" smtClean="0"/>
+              <a:rPr lang="en-US"/>
               <a:t>Fifth level</a:t>
             </a:r>
-            <a:endParaRPr lang="en-US"/>
           </a:p>
         </p:txBody>
       </p:sp>
@@ -1643,38 +2068,37 @@
           <a:p>
             <a:pPr lvl="0"/>
             <a:r>
-              <a:rPr lang="en-US" smtClean="0"/>
+              <a:rPr lang="en-US"/>
               <a:t>Click to edit Master text styles</a:t>
             </a:r>
           </a:p>
           <a:p>
             <a:pPr lvl="1"/>
             <a:r>
-              <a:rPr lang="en-US" smtClean="0"/>
+              <a:rPr lang="en-US"/>
               <a:t>Second level</a:t>
             </a:r>
           </a:p>
           <a:p>
             <a:pPr lvl="2"/>
             <a:r>
-              <a:rPr lang="en-US" smtClean="0"/>
+              <a:rPr lang="en-US"/>
               <a:t>Third level</a:t>
             </a:r>
           </a:p>
           <a:p>
             <a:pPr lvl="3"/>
             <a:r>
-              <a:rPr lang="en-US" smtClean="0"/>
+              <a:rPr lang="en-US"/>
               <a:t>Fourth level</a:t>
             </a:r>
           </a:p>
           <a:p>
             <a:pPr lvl="4"/>
             <a:r>
-              <a:rPr lang="en-US" smtClean="0"/>
+              <a:rPr lang="en-US"/>
               <a:t>Fifth level</a:t>
             </a:r>
-            <a:endParaRPr lang="en-US"/>
           </a:p>
         </p:txBody>
       </p:sp>
@@ -1695,7 +2119,7 @@
           <a:p>
             <a:fld id="{78C97017-6FC3-485B-9764-EAC9E56C1D49}" type="datetimeFigureOut">
               <a:rPr lang="en-US" smtClean="0"/>
-              <a:t>10/16/2016</a:t>
+              <a:t>11/6/2018</a:t>
             </a:fld>
             <a:endParaRPr lang="en-US"/>
           </a:p>
@@ -1793,10 +2217,9 @@
           </a:lstStyle>
           <a:p>
             <a:r>
-              <a:rPr lang="en-US" smtClean="0"/>
+              <a:rPr lang="en-US"/>
               <a:t>Click to edit Master title style</a:t>
             </a:r>
-            <a:endParaRPr lang="en-US"/>
           </a:p>
         </p:txBody>
       </p:sp>
@@ -1859,7 +2282,7 @@
           <a:p>
             <a:pPr lvl="0"/>
             <a:r>
-              <a:rPr lang="en-US" smtClean="0"/>
+              <a:rPr lang="en-US"/>
               <a:t>Click to edit Master text styles</a:t>
             </a:r>
           </a:p>
@@ -1915,38 +2338,37 @@
           <a:p>
             <a:pPr lvl="0"/>
             <a:r>
-              <a:rPr lang="en-US" smtClean="0"/>
+              <a:rPr lang="en-US"/>
               <a:t>Click to edit Master text styles</a:t>
             </a:r>
           </a:p>
           <a:p>
             <a:pPr lvl="1"/>
             <a:r>
-              <a:rPr lang="en-US" smtClean="0"/>
+              <a:rPr lang="en-US"/>
               <a:t>Second level</a:t>
             </a:r>
           </a:p>
           <a:p>
             <a:pPr lvl="2"/>
             <a:r>
-              <a:rPr lang="en-US" smtClean="0"/>
+              <a:rPr lang="en-US"/>
               <a:t>Third level</a:t>
             </a:r>
           </a:p>
           <a:p>
             <a:pPr lvl="3"/>
             <a:r>
-              <a:rPr lang="en-US" smtClean="0"/>
+              <a:rPr lang="en-US"/>
               <a:t>Fourth level</a:t>
             </a:r>
           </a:p>
           <a:p>
             <a:pPr lvl="4"/>
             <a:r>
-              <a:rPr lang="en-US" smtClean="0"/>
+              <a:rPr lang="en-US"/>
               <a:t>Fifth level</a:t>
             </a:r>
-            <a:endParaRPr lang="en-US"/>
           </a:p>
         </p:txBody>
       </p:sp>
@@ -2009,7 +2431,7 @@
           <a:p>
             <a:pPr lvl="0"/>
             <a:r>
-              <a:rPr lang="en-US" smtClean="0"/>
+              <a:rPr lang="en-US"/>
               <a:t>Click to edit Master text styles</a:t>
             </a:r>
           </a:p>
@@ -2065,38 +2487,37 @@
           <a:p>
             <a:pPr lvl="0"/>
             <a:r>
-              <a:rPr lang="en-US" smtClean="0"/>
+              <a:rPr lang="en-US"/>
               <a:t>Click to edit Master text styles</a:t>
             </a:r>
           </a:p>
           <a:p>
             <a:pPr lvl="1"/>
             <a:r>
-              <a:rPr lang="en-US" smtClean="0"/>
+              <a:rPr lang="en-US"/>
               <a:t>Second level</a:t>
             </a:r>
           </a:p>
           <a:p>
             <a:pPr lvl="2"/>
             <a:r>
-              <a:rPr lang="en-US" smtClean="0"/>
+              <a:rPr lang="en-US"/>
               <a:t>Third level</a:t>
             </a:r>
           </a:p>
           <a:p>
             <a:pPr lvl="3"/>
             <a:r>
-              <a:rPr lang="en-US" smtClean="0"/>
+              <a:rPr lang="en-US"/>
               <a:t>Fourth level</a:t>
             </a:r>
           </a:p>
           <a:p>
             <a:pPr lvl="4"/>
             <a:r>
-              <a:rPr lang="en-US" smtClean="0"/>
+              <a:rPr lang="en-US"/>
               <a:t>Fifth level</a:t>
             </a:r>
-            <a:endParaRPr lang="en-US"/>
           </a:p>
         </p:txBody>
       </p:sp>
@@ -2117,7 +2538,7 @@
           <a:p>
             <a:fld id="{78C97017-6FC3-485B-9764-EAC9E56C1D49}" type="datetimeFigureOut">
               <a:rPr lang="en-US" smtClean="0"/>
-              <a:t>10/16/2016</a:t>
+              <a:t>11/6/2018</a:t>
             </a:fld>
             <a:endParaRPr lang="en-US"/>
           </a:p>
@@ -2211,10 +2632,9 @@
           <a:lstStyle/>
           <a:p>
             <a:r>
-              <a:rPr lang="en-US" smtClean="0"/>
+              <a:rPr lang="en-US"/>
               <a:t>Click to edit Master title style</a:t>
             </a:r>
-            <a:endParaRPr lang="en-US"/>
           </a:p>
         </p:txBody>
       </p:sp>
@@ -2235,7 +2655,7 @@
           <a:p>
             <a:fld id="{78C97017-6FC3-485B-9764-EAC9E56C1D49}" type="datetimeFigureOut">
               <a:rPr lang="en-US" smtClean="0"/>
-              <a:t>10/16/2016</a:t>
+              <a:t>11/6/2018</a:t>
             </a:fld>
             <a:endParaRPr lang="en-US"/>
           </a:p>
@@ -2330,7 +2750,7 @@
           <a:p>
             <a:fld id="{78C97017-6FC3-485B-9764-EAC9E56C1D49}" type="datetimeFigureOut">
               <a:rPr lang="en-US" smtClean="0"/>
-              <a:t>10/16/2016</a:t>
+              <a:t>11/6/2018</a:t>
             </a:fld>
             <a:endParaRPr lang="en-US"/>
           </a:p>
@@ -2433,10 +2853,9 @@
           </a:lstStyle>
           <a:p>
             <a:r>
-              <a:rPr lang="en-US" smtClean="0"/>
+              <a:rPr lang="en-US"/>
               <a:t>Click to edit Master title style</a:t>
             </a:r>
-            <a:endParaRPr lang="en-US"/>
           </a:p>
         </p:txBody>
       </p:sp>
@@ -2490,38 +2909,37 @@
           <a:p>
             <a:pPr lvl="0"/>
             <a:r>
-              <a:rPr lang="en-US" smtClean="0"/>
+              <a:rPr lang="en-US"/>
               <a:t>Click to edit Master text styles</a:t>
             </a:r>
           </a:p>
           <a:p>
             <a:pPr lvl="1"/>
             <a:r>
-              <a:rPr lang="en-US" smtClean="0"/>
+              <a:rPr lang="en-US"/>
               <a:t>Second level</a:t>
             </a:r>
           </a:p>
           <a:p>
             <a:pPr lvl="2"/>
             <a:r>
-              <a:rPr lang="en-US" smtClean="0"/>
+              <a:rPr lang="en-US"/>
               <a:t>Third level</a:t>
             </a:r>
           </a:p>
           <a:p>
             <a:pPr lvl="3"/>
             <a:r>
-              <a:rPr lang="en-US" smtClean="0"/>
+              <a:rPr lang="en-US"/>
               <a:t>Fourth level</a:t>
             </a:r>
           </a:p>
           <a:p>
             <a:pPr lvl="4"/>
             <a:r>
-              <a:rPr lang="en-US" smtClean="0"/>
+              <a:rPr lang="en-US"/>
               <a:t>Fifth level</a:t>
             </a:r>
-            <a:endParaRPr lang="en-US"/>
           </a:p>
         </p:txBody>
       </p:sp>
@@ -2584,7 +3002,7 @@
           <a:p>
             <a:pPr lvl="0"/>
             <a:r>
-              <a:rPr lang="en-US" smtClean="0"/>
+              <a:rPr lang="en-US"/>
               <a:t>Click to edit Master text styles</a:t>
             </a:r>
           </a:p>
@@ -2607,7 +3025,7 @@
           <a:p>
             <a:fld id="{78C97017-6FC3-485B-9764-EAC9E56C1D49}" type="datetimeFigureOut">
               <a:rPr lang="en-US" smtClean="0"/>
-              <a:t>10/16/2016</a:t>
+              <a:t>11/6/2018</a:t>
             </a:fld>
             <a:endParaRPr lang="en-US"/>
           </a:p>
@@ -2710,10 +3128,9 @@
           </a:lstStyle>
           <a:p>
             <a:r>
-              <a:rPr lang="en-US" smtClean="0"/>
+              <a:rPr lang="en-US"/>
               <a:t>Click to edit Master title style</a:t>
             </a:r>
-            <a:endParaRPr lang="en-US"/>
           </a:p>
         </p:txBody>
       </p:sp>
@@ -2837,7 +3254,7 @@
           <a:p>
             <a:pPr lvl="0"/>
             <a:r>
-              <a:rPr lang="en-US" smtClean="0"/>
+              <a:rPr lang="en-US"/>
               <a:t>Click to edit Master text styles</a:t>
             </a:r>
           </a:p>
@@ -2860,7 +3277,7 @@
           <a:p>
             <a:fld id="{78C97017-6FC3-485B-9764-EAC9E56C1D49}" type="datetimeFigureOut">
               <a:rPr lang="en-US" smtClean="0"/>
-              <a:t>10/16/2016</a:t>
+              <a:t>11/6/2018</a:t>
             </a:fld>
             <a:endParaRPr lang="en-US"/>
           </a:p>
@@ -2969,10 +3386,9 @@
           <a:lstStyle/>
           <a:p>
             <a:r>
-              <a:rPr lang="en-US" smtClean="0"/>
+              <a:rPr lang="en-US"/>
               <a:t>Click to edit Master title style</a:t>
             </a:r>
-            <a:endParaRPr lang="en-US"/>
           </a:p>
         </p:txBody>
       </p:sp>
@@ -3003,38 +3419,37 @@
           <a:p>
             <a:pPr lvl="0"/>
             <a:r>
-              <a:rPr lang="en-US" smtClean="0"/>
+              <a:rPr lang="en-US"/>
               <a:t>Click to edit Master text styles</a:t>
             </a:r>
           </a:p>
           <a:p>
             <a:pPr lvl="1"/>
             <a:r>
-              <a:rPr lang="en-US" smtClean="0"/>
+              <a:rPr lang="en-US"/>
               <a:t>Second level</a:t>
             </a:r>
           </a:p>
           <a:p>
             <a:pPr lvl="2"/>
             <a:r>
-              <a:rPr lang="en-US" smtClean="0"/>
+              <a:rPr lang="en-US"/>
               <a:t>Third level</a:t>
             </a:r>
           </a:p>
           <a:p>
             <a:pPr lvl="3"/>
             <a:r>
-              <a:rPr lang="en-US" smtClean="0"/>
+              <a:rPr lang="en-US"/>
               <a:t>Fourth level</a:t>
             </a:r>
           </a:p>
           <a:p>
             <a:pPr lvl="4"/>
             <a:r>
-              <a:rPr lang="en-US" smtClean="0"/>
+              <a:rPr lang="en-US"/>
               <a:t>Fifth level</a:t>
             </a:r>
-            <a:endParaRPr lang="en-US"/>
           </a:p>
         </p:txBody>
       </p:sp>
@@ -3073,7 +3488,7 @@
           <a:p>
             <a:fld id="{78C97017-6FC3-485B-9764-EAC9E56C1D49}" type="datetimeFigureOut">
               <a:rPr lang="en-US" smtClean="0"/>
-              <a:t>10/16/2016</a:t>
+              <a:t>11/6/2018</a:t>
             </a:fld>
             <a:endParaRPr lang="en-US"/>
           </a:p>
@@ -3457,7 +3872,7 @@
         <p:spPr>
           <a:xfrm>
             <a:off x="1119865" y="2086382"/>
-            <a:ext cx="7871735" cy="1723618"/>
+            <a:ext cx="7871735" cy="2960213"/>
           </a:xfrm>
           <a:prstGeom prst="roundRect">
             <a:avLst>
@@ -3494,7 +3909,7 @@
           <a:lstStyle/>
           <a:p>
             <a:r>
-              <a:rPr lang="en-US" sz="1200" b="1" dirty="0" smtClean="0">
+              <a:rPr lang="en-US" sz="1200" b="1">
                 <a:solidFill>
                   <a:schemeClr val="accent6">
                     <a:lumMod val="75000"/>
@@ -3503,7 +3918,7 @@
               </a:rPr>
               <a:t>Storage</a:t>
             </a:r>
-            <a:endParaRPr lang="en-SG" sz="1200" b="1" dirty="0">
+            <a:endParaRPr lang="en-SG" sz="1200" b="1">
               <a:solidFill>
                 <a:schemeClr val="accent6">
                   <a:lumMod val="75000"/>
@@ -3521,7 +3936,7 @@
         </p:nvSpPr>
         <p:spPr>
           <a:xfrm>
-            <a:off x="2877180" y="3158440"/>
+            <a:off x="2877180" y="3249199"/>
             <a:ext cx="1323049" cy="346760"/>
           </a:xfrm>
           <a:prstGeom prst="rect">
@@ -3561,32 +3976,35 @@
           <a:p>
             <a:pPr algn="ctr"/>
             <a:r>
-              <a:rPr lang="en-US" sz="1050" dirty="0" smtClean="0">
+              <a:rPr lang="en-US" sz="1050">
+                <a:solidFill>
+                  <a:schemeClr val="bg1"/>
+                </a:solidFill>
+                <a:cs typeface="Calibri"/>
+              </a:rPr>
+              <a:t>&lt;&lt;interface&gt;&gt;</a:t>
+            </a:r>
+            <a:endParaRPr lang="en-US" sz="1050">
+              <a:solidFill>
+                <a:schemeClr val="bg1"/>
+              </a:solidFill>
+            </a:endParaRPr>
+          </a:p>
+          <a:p>
+            <a:pPr algn="ctr"/>
+            <a:r>
+              <a:rPr lang="en-US" sz="1050" err="1">
                 <a:solidFill>
                   <a:schemeClr val="bg1"/>
                 </a:solidFill>
               </a:rPr>
-              <a:t>&lt;&lt;interface&gt;&gt;</a:t>
-            </a:r>
-            <a:br>
-              <a:rPr lang="en-US" sz="1050" dirty="0" smtClean="0">
-                <a:solidFill>
-                  <a:schemeClr val="bg1"/>
-                </a:solidFill>
-              </a:rPr>
-            </a:br>
-            <a:r>
-              <a:rPr lang="en-US" sz="1050" dirty="0" err="1" smtClean="0">
-                <a:solidFill>
-                  <a:schemeClr val="bg1"/>
-                </a:solidFill>
-              </a:rPr>
-              <a:t>AddressBookStorage</a:t>
-            </a:r>
-            <a:endParaRPr lang="en-SG" sz="1050" dirty="0">
+              <a:t>FoodZoomStorage</a:t>
+            </a:r>
+            <a:endParaRPr lang="en-US" err="1">
               <a:solidFill>
                 <a:schemeClr val="bg1"/>
               </a:solidFill>
+              <a:cs typeface="Calibri"/>
             </a:endParaRPr>
           </a:p>
         </p:txBody>
@@ -3599,8 +4017,8 @@
         </p:nvSpPr>
         <p:spPr>
           <a:xfrm rot="16200000">
-            <a:off x="1683963" y="2868687"/>
-            <a:ext cx="1093635" cy="346760"/>
+            <a:off x="1295400" y="3393389"/>
+            <a:ext cx="1904796" cy="358104"/>
           </a:xfrm>
           <a:prstGeom prst="rect">
             <a:avLst/>
@@ -3639,14 +4057,14 @@
           <a:p>
             <a:pPr algn="ctr"/>
             <a:r>
-              <a:rPr lang="en-US" sz="1050" dirty="0" err="1" smtClean="0">
+              <a:rPr lang="en-US" sz="1050" err="1">
                 <a:solidFill>
                   <a:schemeClr val="bg1"/>
                 </a:solidFill>
               </a:rPr>
               <a:t>StorageManager</a:t>
             </a:r>
-            <a:endParaRPr lang="en-SG" sz="1050" dirty="0">
+            <a:endParaRPr lang="en-SG" sz="1050">
               <a:solidFill>
                 <a:schemeClr val="bg1"/>
               </a:solidFill>
@@ -3662,8 +4080,8 @@
         </p:nvSpPr>
         <p:spPr>
           <a:xfrm rot="16200000">
-            <a:off x="956202" y="2861202"/>
-            <a:ext cx="1093635" cy="346760"/>
+            <a:off x="380448" y="3431284"/>
+            <a:ext cx="2239471" cy="352432"/>
           </a:xfrm>
           <a:prstGeom prst="rect">
             <a:avLst/>
@@ -3702,7 +4120,7 @@
           <a:p>
             <a:pPr algn="ctr"/>
             <a:r>
-              <a:rPr lang="en-US" sz="1050" dirty="0">
+              <a:rPr lang="en-US" sz="1050">
                 <a:solidFill>
                   <a:schemeClr val="bg1"/>
                 </a:solidFill>
@@ -3713,14 +4131,14 @@
           <a:p>
             <a:pPr algn="ctr"/>
             <a:r>
-              <a:rPr lang="en-US" sz="1050" dirty="0" smtClean="0">
+              <a:rPr lang="en-US" sz="1050">
                 <a:solidFill>
                   <a:schemeClr val="bg1"/>
                 </a:solidFill>
               </a:rPr>
               <a:t>Storage</a:t>
             </a:r>
-            <a:endParaRPr lang="en-SG" sz="1050" dirty="0">
+            <a:endParaRPr lang="en-SG" sz="1050">
               <a:solidFill>
                 <a:schemeClr val="bg1"/>
               </a:solidFill>
@@ -3736,7 +4154,7 @@
         </p:nvSpPr>
         <p:spPr>
           <a:xfrm rot="16200000">
-            <a:off x="1626910" y="2952291"/>
+            <a:off x="1649600" y="3485502"/>
             <a:ext cx="270504" cy="175523"/>
           </a:xfrm>
           <a:prstGeom prst="triangle">
@@ -3787,15 +4205,14 @@
         <p:nvCxnSpPr>
           <p:cNvPr id="58" name="Straight Arrow Connector 57"/>
           <p:cNvCxnSpPr>
-            <a:stCxn id="42" idx="3"/>
-            <a:endCxn id="2" idx="1"/>
+            <a:cxnSpLocks/>
           </p:cNvCxnSpPr>
           <p:nvPr/>
         </p:nvCxnSpPr>
         <p:spPr>
-          <a:xfrm>
-            <a:off x="2656370" y="3326536"/>
-            <a:ext cx="220810" cy="5284"/>
+          <a:xfrm flipV="1">
+            <a:off x="2656370" y="3416291"/>
+            <a:ext cx="217216" cy="1004"/>
           </a:xfrm>
           <a:prstGeom prst="straightConnector1">
             <a:avLst/>
@@ -3834,7 +4251,7 @@
         </p:nvCxnSpPr>
         <p:spPr>
           <a:xfrm>
-            <a:off x="910091" y="3040053"/>
+            <a:off x="910091" y="3595954"/>
             <a:ext cx="419548" cy="2860"/>
           </a:xfrm>
           <a:prstGeom prst="bentConnector3">
@@ -3873,13 +4290,13 @@
         <p:nvCxnSpPr>
           <p:cNvPr id="21" name="Straight Connector 20"/>
           <p:cNvCxnSpPr>
-            <a:stCxn id="120" idx="3"/>
+            <a:cxnSpLocks/>
           </p:cNvCxnSpPr>
           <p:nvPr/>
         </p:nvCxnSpPr>
         <p:spPr>
           <a:xfrm flipV="1">
-            <a:off x="1849924" y="3040052"/>
+            <a:off x="1872614" y="3573263"/>
             <a:ext cx="216105" cy="1"/>
           </a:xfrm>
           <a:prstGeom prst="line">
@@ -3920,7 +4337,7 @@
         </p:nvSpPr>
         <p:spPr>
           <a:xfrm>
-            <a:off x="2420322" y="3239846"/>
+            <a:off x="2420322" y="3330605"/>
             <a:ext cx="236048" cy="173380"/>
           </a:xfrm>
           <a:prstGeom prst="flowChartDecision">
@@ -3967,14 +4384,13 @@
         <p:nvCxnSpPr>
           <p:cNvPr id="97" name="Elbow Connector 63"/>
           <p:cNvCxnSpPr>
-            <a:stCxn id="99" idx="3"/>
-            <a:endCxn id="50" idx="1"/>
+            <a:cxnSpLocks/>
           </p:cNvCxnSpPr>
           <p:nvPr/>
         </p:nvCxnSpPr>
         <p:spPr>
           <a:xfrm flipV="1">
-            <a:off x="4398041" y="3331820"/>
+            <a:off x="4398041" y="3422579"/>
             <a:ext cx="223324" cy="1"/>
           </a:xfrm>
           <a:prstGeom prst="bentConnector3">
@@ -4017,7 +4433,7 @@
         </p:nvSpPr>
         <p:spPr>
           <a:xfrm rot="5400000" flipV="1">
-            <a:off x="4175027" y="3244059"/>
+            <a:off x="4175027" y="3334818"/>
             <a:ext cx="270504" cy="175523"/>
           </a:xfrm>
           <a:prstGeom prst="triangle">
@@ -4068,14 +4484,13 @@
         <p:nvCxnSpPr>
           <p:cNvPr id="124" name="Elbow Connector 122"/>
           <p:cNvCxnSpPr>
-            <a:stCxn id="50" idx="3"/>
-            <a:endCxn id="66" idx="1"/>
+            <a:cxnSpLocks/>
           </p:cNvCxnSpPr>
           <p:nvPr/>
         </p:nvCxnSpPr>
         <p:spPr>
           <a:xfrm>
-            <a:off x="5791200" y="3331820"/>
+            <a:off x="5654615" y="3422579"/>
             <a:ext cx="228600" cy="1970"/>
           </a:xfrm>
           <a:prstGeom prst="bentConnector3">
@@ -4118,8 +4533,8 @@
         </p:nvSpPr>
         <p:spPr>
           <a:xfrm>
-            <a:off x="4621365" y="3158440"/>
-            <a:ext cx="1169835" cy="346760"/>
+            <a:off x="4617771" y="3134181"/>
+            <a:ext cx="1047628" cy="691816"/>
           </a:xfrm>
           <a:prstGeom prst="rect">
             <a:avLst/>
@@ -4147,45 +4562,16 @@
           <a:p>
             <a:pPr algn="ctr"/>
             <a:r>
-              <a:rPr lang="en-US" sz="1050" b="1" dirty="0" err="1" smtClean="0">
+              <a:rPr lang="en-US" sz="1050" b="1" err="1">
                 <a:solidFill>
                   <a:schemeClr val="accent6">
                     <a:lumMod val="75000"/>
                   </a:schemeClr>
                 </a:solidFill>
               </a:rPr>
-              <a:t>XmlAddressBook</a:t>
-            </a:r>
-            <a:r>
-              <a:rPr lang="en-US" sz="1050" b="1" dirty="0" smtClean="0">
-                <a:solidFill>
-                  <a:schemeClr val="accent6">
-                    <a:lumMod val="75000"/>
-                  </a:schemeClr>
-                </a:solidFill>
-              </a:rPr>
-              <a:t/>
-            </a:r>
-            <a:br>
-              <a:rPr lang="en-US" sz="1050" b="1" dirty="0" smtClean="0">
-                <a:solidFill>
-                  <a:schemeClr val="accent6">
-                    <a:lumMod val="75000"/>
-                  </a:schemeClr>
-                </a:solidFill>
-              </a:rPr>
-            </a:br>
-            <a:r>
-              <a:rPr lang="en-US" sz="1050" b="1" dirty="0" smtClean="0">
-                <a:solidFill>
-                  <a:schemeClr val="accent6">
-                    <a:lumMod val="75000"/>
-                  </a:schemeClr>
-                </a:solidFill>
-              </a:rPr>
-              <a:t>Storage</a:t>
-            </a:r>
-            <a:endParaRPr lang="en-SG" sz="1050" b="1" dirty="0">
+              <a:t>XmlFoodZoomStorage</a:t>
+            </a:r>
+            <a:endParaRPr lang="en-US" err="1">
               <a:solidFill>
                 <a:schemeClr val="accent6">
                   <a:lumMod val="75000"/>
@@ -4203,7 +4589,7 @@
         </p:nvSpPr>
         <p:spPr>
           <a:xfrm>
-            <a:off x="2873943" y="2558040"/>
+            <a:off x="2873943" y="2648799"/>
             <a:ext cx="1323049" cy="346760"/>
           </a:xfrm>
           <a:prstGeom prst="rect">
@@ -4243,7 +4629,7 @@
           <a:p>
             <a:pPr algn="ctr"/>
             <a:r>
-              <a:rPr lang="en-US" sz="1050" dirty="0" smtClean="0">
+              <a:rPr lang="en-US" sz="1050">
                 <a:solidFill>
                   <a:schemeClr val="bg1"/>
                 </a:solidFill>
@@ -4251,21 +4637,21 @@
               <a:t>&lt;&lt;interface&gt;&gt;</a:t>
             </a:r>
             <a:br>
-              <a:rPr lang="en-US" sz="1050" dirty="0" smtClean="0">
+              <a:rPr lang="en-US" sz="1050">
                 <a:solidFill>
                   <a:schemeClr val="bg1"/>
                 </a:solidFill>
               </a:rPr>
             </a:br>
             <a:r>
-              <a:rPr lang="en-US" sz="1050" dirty="0" err="1" smtClean="0">
+              <a:rPr lang="en-US" sz="1050" err="1">
                 <a:solidFill>
                   <a:schemeClr val="bg1"/>
                 </a:solidFill>
               </a:rPr>
               <a:t>UserPrefsStorage</a:t>
             </a:r>
-            <a:endParaRPr lang="en-SG" sz="1050" dirty="0">
+            <a:endParaRPr lang="en-SG" sz="1050">
               <a:solidFill>
                 <a:schemeClr val="bg1"/>
               </a:solidFill>
@@ -4277,15 +4663,14 @@
         <p:nvCxnSpPr>
           <p:cNvPr id="54" name="Straight Arrow Connector 53"/>
           <p:cNvCxnSpPr>
-            <a:stCxn id="56" idx="3"/>
-            <a:endCxn id="52" idx="1"/>
+            <a:cxnSpLocks/>
           </p:cNvCxnSpPr>
           <p:nvPr/>
         </p:nvCxnSpPr>
         <p:spPr>
-          <a:xfrm>
-            <a:off x="2653133" y="2726136"/>
-            <a:ext cx="220810" cy="5284"/>
+          <a:xfrm flipV="1">
+            <a:off x="2624380" y="2905750"/>
+            <a:ext cx="245969" cy="8192"/>
           </a:xfrm>
           <a:prstGeom prst="straightConnector1">
             <a:avLst/>
@@ -4324,7 +4709,7 @@
         </p:nvSpPr>
         <p:spPr>
           <a:xfrm>
-            <a:off x="2417085" y="2639446"/>
+            <a:off x="2417085" y="2820964"/>
             <a:ext cx="236048" cy="173380"/>
           </a:xfrm>
           <a:prstGeom prst="flowChartDecision">
@@ -4371,14 +4756,13 @@
         <p:nvCxnSpPr>
           <p:cNvPr id="60" name="Elbow Connector 63"/>
           <p:cNvCxnSpPr>
-            <a:stCxn id="61" idx="3"/>
-            <a:endCxn id="65" idx="1"/>
+            <a:cxnSpLocks/>
           </p:cNvCxnSpPr>
           <p:nvPr/>
         </p:nvCxnSpPr>
         <p:spPr>
           <a:xfrm flipV="1">
-            <a:off x="4394804" y="2731420"/>
+            <a:off x="4394804" y="2822179"/>
             <a:ext cx="223324" cy="1"/>
           </a:xfrm>
           <a:prstGeom prst="bentConnector3">
@@ -4421,7 +4805,7 @@
         </p:nvSpPr>
         <p:spPr>
           <a:xfrm rot="5400000" flipV="1">
-            <a:off x="4171790" y="2643659"/>
+            <a:off x="4171790" y="2734418"/>
             <a:ext cx="270504" cy="175523"/>
           </a:xfrm>
           <a:prstGeom prst="triangle">
@@ -4476,7 +4860,7 @@
         </p:nvSpPr>
         <p:spPr>
           <a:xfrm>
-            <a:off x="4618128" y="2558040"/>
+            <a:off x="4618128" y="2648799"/>
             <a:ext cx="1093635" cy="346760"/>
           </a:xfrm>
           <a:prstGeom prst="rect">
@@ -4516,37 +4900,29 @@
           <a:p>
             <a:pPr algn="ctr"/>
             <a:r>
-              <a:rPr lang="en-US" sz="1050" dirty="0" err="1" smtClean="0">
+              <a:rPr lang="en-US" sz="1050" err="1">
                 <a:solidFill>
                   <a:schemeClr val="bg1"/>
                 </a:solidFill>
               </a:rPr>
               <a:t>JsonUserPrefs</a:t>
             </a:r>
-            <a:r>
-              <a:rPr lang="en-US" sz="1050" dirty="0" smtClean="0">
-                <a:solidFill>
-                  <a:schemeClr val="bg1"/>
-                </a:solidFill>
-              </a:rPr>
-              <a:t/>
-            </a:r>
             <a:br>
-              <a:rPr lang="en-US" sz="1050" dirty="0" smtClean="0">
+              <a:rPr lang="en-US" sz="1050">
                 <a:solidFill>
                   <a:schemeClr val="bg1"/>
                 </a:solidFill>
               </a:rPr>
             </a:br>
             <a:r>
-              <a:rPr lang="en-US" sz="1050" dirty="0" smtClean="0">
+              <a:rPr lang="en-US" sz="1050">
                 <a:solidFill>
                   <a:schemeClr val="bg1"/>
                 </a:solidFill>
               </a:rPr>
               <a:t>Storage</a:t>
             </a:r>
-            <a:endParaRPr lang="en-SG" sz="1050" dirty="0">
+            <a:endParaRPr lang="en-SG" sz="1050">
               <a:solidFill>
                 <a:schemeClr val="bg1"/>
               </a:solidFill>
@@ -4562,8 +4938,8 @@
         </p:nvSpPr>
         <p:spPr>
           <a:xfrm>
-            <a:off x="6019800" y="3160410"/>
-            <a:ext cx="1200707" cy="346760"/>
+            <a:off x="5883215" y="3136151"/>
+            <a:ext cx="1003019" cy="688221"/>
           </a:xfrm>
           <a:prstGeom prst="rect">
             <a:avLst/>
@@ -4591,67 +4967,137 @@
           <a:p>
             <a:pPr algn="ctr"/>
             <a:r>
-              <a:rPr lang="en-US" sz="1050" b="1" dirty="0" err="1" smtClean="0">
+              <a:rPr lang="en-US" sz="1050" b="1">
                 <a:solidFill>
                   <a:schemeClr val="accent6">
                     <a:lumMod val="75000"/>
                   </a:schemeClr>
                 </a:solidFill>
               </a:rPr>
-              <a:t>XmlSerializable</a:t>
-            </a:r>
-            <a:r>
-              <a:rPr lang="en-US" sz="1050" b="1" dirty="0" smtClean="0">
+              <a:t>XmlFoodZoom</a:t>
+            </a:r>
+            <a:endParaRPr lang="en-US">
+              <a:solidFill>
+                <a:schemeClr val="accent6">
+                  <a:lumMod val="75000"/>
+                </a:schemeClr>
+              </a:solidFill>
+            </a:endParaRPr>
+          </a:p>
+        </p:txBody>
+      </p:sp>
+      <p:sp>
+        <p:nvSpPr>
+          <p:cNvPr id="73" name="Rectangle 8"/>
+          <p:cNvSpPr/>
+          <p:nvPr/>
+        </p:nvSpPr>
+        <p:spPr>
+          <a:xfrm>
+            <a:off x="7227549" y="2510906"/>
+            <a:ext cx="1259718" cy="346760"/>
+          </a:xfrm>
+          <a:prstGeom prst="rect">
+            <a:avLst/>
+          </a:prstGeom>
+          <a:ln w="19050"/>
+          <a:effectLst/>
+        </p:spPr>
+        <p:style>
+          <a:lnRef idx="1">
+            <a:schemeClr val="accent6"/>
+          </a:lnRef>
+          <a:fillRef idx="2">
+            <a:schemeClr val="accent6"/>
+          </a:fillRef>
+          <a:effectRef idx="1">
+            <a:schemeClr val="accent6"/>
+          </a:effectRef>
+          <a:fontRef idx="minor">
+            <a:schemeClr val="dk1"/>
+          </a:fontRef>
+        </p:style>
+        <p:txBody>
+          <a:bodyPr rtlCol="0" anchor="ctr"/>
+          <a:lstStyle/>
+          <a:p>
+            <a:pPr algn="ctr"/>
+            <a:r>
+              <a:rPr lang="en-US" sz="1050" b="1">
                 <a:solidFill>
                   <a:schemeClr val="accent6">
                     <a:lumMod val="75000"/>
                   </a:schemeClr>
                 </a:solidFill>
               </a:rPr>
-              <a:t/>
-            </a:r>
-            <a:br>
-              <a:rPr lang="en-US" sz="1050" b="1" dirty="0" smtClean="0">
+              <a:t>XmlAdaptedOrder</a:t>
+            </a:r>
+            <a:endParaRPr lang="en-US"/>
+          </a:p>
+        </p:txBody>
+      </p:sp>
+      <p:sp>
+        <p:nvSpPr>
+          <p:cNvPr id="74" name="Rectangle 8"/>
+          <p:cNvSpPr/>
+          <p:nvPr/>
+        </p:nvSpPr>
+        <p:spPr>
+          <a:xfrm>
+            <a:off x="7299436" y="3095827"/>
+            <a:ext cx="1105162" cy="346760"/>
+          </a:xfrm>
+          <a:prstGeom prst="rect">
+            <a:avLst/>
+          </a:prstGeom>
+          <a:ln w="19050"/>
+          <a:effectLst/>
+        </p:spPr>
+        <p:style>
+          <a:lnRef idx="1">
+            <a:schemeClr val="accent6"/>
+          </a:lnRef>
+          <a:fillRef idx="2">
+            <a:schemeClr val="accent6"/>
+          </a:fillRef>
+          <a:effectRef idx="1">
+            <a:schemeClr val="accent6"/>
+          </a:effectRef>
+          <a:fontRef idx="minor">
+            <a:schemeClr val="dk1"/>
+          </a:fontRef>
+        </p:style>
+        <p:txBody>
+          <a:bodyPr rtlCol="0" anchor="ctr"/>
+          <a:lstStyle/>
+          <a:p>
+            <a:pPr algn="ctr"/>
+            <a:r>
+              <a:rPr lang="en-US" sz="1050" b="1">
                 <a:solidFill>
                   <a:schemeClr val="accent6">
                     <a:lumMod val="75000"/>
                   </a:schemeClr>
                 </a:solidFill>
               </a:rPr>
-            </a:br>
-            <a:r>
-              <a:rPr lang="en-US" sz="1050" b="1" dirty="0" err="1" smtClean="0">
-                <a:solidFill>
-                  <a:schemeClr val="accent6">
-                    <a:lumMod val="75000"/>
-                  </a:schemeClr>
-                </a:solidFill>
-              </a:rPr>
-              <a:t>AddressBook</a:t>
-            </a:r>
-            <a:endParaRPr lang="en-SG" sz="1050" b="1" dirty="0">
-              <a:solidFill>
-                <a:schemeClr val="accent6">
-                  <a:lumMod val="75000"/>
-                </a:schemeClr>
-              </a:solidFill>
-            </a:endParaRPr>
+              <a:t>XmlSerializableOrderBook</a:t>
+            </a:r>
+            <a:endParaRPr lang="en-US"/>
           </a:p>
         </p:txBody>
       </p:sp>
       <p:cxnSp>
         <p:nvCxnSpPr>
-          <p:cNvPr id="70" name="Elbow Connector 122"/>
+          <p:cNvPr id="77" name="Elbow Connector 122"/>
           <p:cNvCxnSpPr>
-            <a:stCxn id="74" idx="0"/>
-            <a:endCxn id="73" idx="2"/>
+            <a:cxnSpLocks/>
           </p:cNvCxnSpPr>
           <p:nvPr/>
         </p:nvCxnSpPr>
         <p:spPr>
-          <a:xfrm rot="5400000" flipH="1" flipV="1">
-            <a:off x="8077993" y="2992020"/>
-            <a:ext cx="335208" cy="12700"/>
+          <a:xfrm flipV="1">
+            <a:off x="6907799" y="3301555"/>
+            <a:ext cx="395231" cy="786"/>
           </a:xfrm>
           <a:prstGeom prst="bentConnector3">
             <a:avLst>
@@ -4682,14 +5128,212 @@
       </p:cxnSp>
       <p:sp>
         <p:nvSpPr>
-          <p:cNvPr id="73" name="Rectangle 8"/>
+          <p:cNvPr id="30" name="Rectangle 8">
+            <a:extLst>
+              <a:ext uri="{FF2B5EF4-FFF2-40B4-BE49-F238E27FC236}">
+                <a16:creationId xmlns:a16="http://schemas.microsoft.com/office/drawing/2014/main" id="{367C9AFE-2593-4350-A75D-FD9C44CB57B4}"/>
+              </a:ext>
+            </a:extLst>
+          </p:cNvPr>
           <p:cNvSpPr/>
           <p:nvPr/>
         </p:nvSpPr>
         <p:spPr>
           <a:xfrm>
-            <a:off x="7615738" y="2477656"/>
-            <a:ext cx="1259718" cy="346760"/>
+            <a:off x="2880774" y="3932123"/>
+            <a:ext cx="1323049" cy="346760"/>
+          </a:xfrm>
+          <a:prstGeom prst="rect">
+            <a:avLst/>
+          </a:prstGeom>
+          <a:solidFill>
+            <a:schemeClr val="accent6">
+              <a:lumMod val="75000"/>
+            </a:schemeClr>
+          </a:solidFill>
+          <a:ln w="19050">
+            <a:solidFill>
+              <a:schemeClr val="accent6">
+                <a:lumMod val="75000"/>
+              </a:schemeClr>
+            </a:solidFill>
+          </a:ln>
+          <a:effectLst/>
+        </p:spPr>
+        <p:style>
+          <a:lnRef idx="1">
+            <a:schemeClr val="accent2"/>
+          </a:lnRef>
+          <a:fillRef idx="2">
+            <a:schemeClr val="accent2"/>
+          </a:fillRef>
+          <a:effectRef idx="1">
+            <a:schemeClr val="accent2"/>
+          </a:effectRef>
+          <a:fontRef idx="minor">
+            <a:schemeClr val="dk1"/>
+          </a:fontRef>
+        </p:style>
+        <p:txBody>
+          <a:bodyPr rtlCol="0" anchor="ctr"/>
+          <a:lstStyle/>
+          <a:p>
+            <a:pPr algn="ctr"/>
+            <a:r>
+              <a:rPr lang="en-US" sz="1050">
+                <a:solidFill>
+                  <a:schemeClr val="bg1"/>
+                </a:solidFill>
+                <a:cs typeface="Calibri"/>
+              </a:rPr>
+              <a:t>&lt;&lt;interface&gt;&gt;</a:t>
+            </a:r>
+            <a:endParaRPr lang="en-US" sz="1050">
+              <a:solidFill>
+                <a:schemeClr val="bg1"/>
+              </a:solidFill>
+            </a:endParaRPr>
+          </a:p>
+          <a:p>
+            <a:pPr algn="ctr"/>
+            <a:r>
+              <a:rPr lang="en-US" sz="1050" err="1">
+                <a:solidFill>
+                  <a:schemeClr val="bg1"/>
+                </a:solidFill>
+              </a:rPr>
+              <a:t>UsersListStorage</a:t>
+            </a:r>
+            <a:endParaRPr lang="en-US" err="1">
+              <a:solidFill>
+                <a:schemeClr val="bg1"/>
+              </a:solidFill>
+              <a:cs typeface="Calibri"/>
+            </a:endParaRPr>
+          </a:p>
+        </p:txBody>
+      </p:sp>
+      <p:cxnSp>
+        <p:nvCxnSpPr>
+          <p:cNvPr id="31" name="Straight Arrow Connector 30">
+            <a:extLst>
+              <a:ext uri="{FF2B5EF4-FFF2-40B4-BE49-F238E27FC236}">
+                <a16:creationId xmlns:a16="http://schemas.microsoft.com/office/drawing/2014/main" id="{8B424672-92AB-4578-AF40-C151F7A5AB3B}"/>
+              </a:ext>
+            </a:extLst>
+          </p:cNvPr>
+          <p:cNvCxnSpPr>
+            <a:cxnSpLocks/>
+          </p:cNvCxnSpPr>
+          <p:nvPr/>
+        </p:nvCxnSpPr>
+        <p:spPr>
+          <a:xfrm flipV="1">
+            <a:off x="2659964" y="4099215"/>
+            <a:ext cx="217216" cy="1004"/>
+          </a:xfrm>
+          <a:prstGeom prst="straightConnector1">
+            <a:avLst/>
+          </a:prstGeom>
+          <a:ln w="19050">
+            <a:solidFill>
+              <a:schemeClr val="accent6">
+                <a:lumMod val="75000"/>
+              </a:schemeClr>
+            </a:solidFill>
+            <a:headEnd type="none" w="med" len="med"/>
+            <a:tailEnd type="arrow" w="med" len="med"/>
+          </a:ln>
+          <a:effectLst/>
+        </p:spPr>
+        <p:style>
+          <a:lnRef idx="1">
+            <a:schemeClr val="accent2"/>
+          </a:lnRef>
+          <a:fillRef idx="2">
+            <a:schemeClr val="accent2"/>
+          </a:fillRef>
+          <a:effectRef idx="1">
+            <a:schemeClr val="accent2"/>
+          </a:effectRef>
+          <a:fontRef idx="minor">
+            <a:schemeClr val="dk1"/>
+          </a:fontRef>
+        </p:style>
+      </p:cxnSp>
+      <p:sp>
+        <p:nvSpPr>
+          <p:cNvPr id="32" name="Flowchart: Decision 96">
+            <a:extLst>
+              <a:ext uri="{FF2B5EF4-FFF2-40B4-BE49-F238E27FC236}">
+                <a16:creationId xmlns:a16="http://schemas.microsoft.com/office/drawing/2014/main" id="{3AC7F8A2-C75A-4DAD-8668-70C0EF3345E2}"/>
+              </a:ext>
+            </a:extLst>
+          </p:cNvPr>
+          <p:cNvSpPr/>
+          <p:nvPr/>
+        </p:nvSpPr>
+        <p:spPr>
+          <a:xfrm>
+            <a:off x="2423916" y="4013529"/>
+            <a:ext cx="236048" cy="173380"/>
+          </a:xfrm>
+          <a:prstGeom prst="flowChartDecision">
+            <a:avLst/>
+          </a:prstGeom>
+          <a:noFill/>
+          <a:ln w="19050">
+            <a:solidFill>
+              <a:schemeClr val="accent6">
+                <a:lumMod val="75000"/>
+              </a:schemeClr>
+            </a:solidFill>
+          </a:ln>
+          <a:effectLst/>
+        </p:spPr>
+        <p:style>
+          <a:lnRef idx="1">
+            <a:schemeClr val="accent2"/>
+          </a:lnRef>
+          <a:fillRef idx="2">
+            <a:schemeClr val="accent2"/>
+          </a:fillRef>
+          <a:effectRef idx="1">
+            <a:schemeClr val="accent2"/>
+          </a:effectRef>
+          <a:fontRef idx="minor">
+            <a:schemeClr val="dk1"/>
+          </a:fontRef>
+        </p:style>
+        <p:txBody>
+          <a:bodyPr rtlCol="0" anchor="ctr"/>
+          <a:lstStyle/>
+          <a:p>
+            <a:pPr algn="ctr"/>
+            <a:endParaRPr lang="en-US" sz="1050">
+              <a:solidFill>
+                <a:schemeClr val="bg1"/>
+              </a:solidFill>
+            </a:endParaRPr>
+          </a:p>
+        </p:txBody>
+      </p:sp>
+      <p:sp>
+        <p:nvSpPr>
+          <p:cNvPr id="29" name="Rectangle 8">
+            <a:extLst>
+              <a:ext uri="{FF2B5EF4-FFF2-40B4-BE49-F238E27FC236}">
+                <a16:creationId xmlns:a16="http://schemas.microsoft.com/office/drawing/2014/main" id="{65952621-7961-4108-A51C-965A4A2A2421}"/>
+              </a:ext>
+            </a:extLst>
+          </p:cNvPr>
+          <p:cNvSpPr/>
+          <p:nvPr/>
+        </p:nvSpPr>
+        <p:spPr>
+          <a:xfrm>
+            <a:off x="7299435" y="3523552"/>
+            <a:ext cx="1105162" cy="346760"/>
           </a:xfrm>
           <a:prstGeom prst="rect">
             <a:avLst/>
@@ -4717,16 +5361,16 @@
           <a:p>
             <a:pPr algn="ctr"/>
             <a:r>
-              <a:rPr lang="en-US" sz="1050" b="1" dirty="0" err="1" smtClean="0">
+              <a:rPr lang="en-US" sz="1050" b="1">
                 <a:solidFill>
                   <a:schemeClr val="accent6">
                     <a:lumMod val="75000"/>
                   </a:schemeClr>
                 </a:solidFill>
               </a:rPr>
-              <a:t>XmlAdaptedTag</a:t>
-            </a:r>
-            <a:endParaRPr lang="en-SG" sz="1050" b="1" dirty="0">
+              <a:t>XmlSerializableDeliverymenList</a:t>
+            </a:r>
+            <a:endParaRPr lang="en-US">
               <a:solidFill>
                 <a:schemeClr val="accent6">
                   <a:lumMod val="75000"/>
@@ -4736,74 +5380,23 @@
           </a:p>
         </p:txBody>
       </p:sp>
-      <p:sp>
-        <p:nvSpPr>
-          <p:cNvPr id="74" name="Rectangle 8"/>
-          <p:cNvSpPr/>
-          <p:nvPr/>
-        </p:nvSpPr>
-        <p:spPr>
-          <a:xfrm>
-            <a:off x="7615738" y="3159624"/>
-            <a:ext cx="1259718" cy="346760"/>
-          </a:xfrm>
-          <a:prstGeom prst="rect">
-            <a:avLst/>
-          </a:prstGeom>
-          <a:ln w="19050"/>
-          <a:effectLst/>
-        </p:spPr>
-        <p:style>
-          <a:lnRef idx="1">
-            <a:schemeClr val="accent6"/>
-          </a:lnRef>
-          <a:fillRef idx="2">
-            <a:schemeClr val="accent6"/>
-          </a:fillRef>
-          <a:effectRef idx="1">
-            <a:schemeClr val="accent6"/>
-          </a:effectRef>
-          <a:fontRef idx="minor">
-            <a:schemeClr val="dk1"/>
-          </a:fontRef>
-        </p:style>
-        <p:txBody>
-          <a:bodyPr rtlCol="0" anchor="ctr"/>
-          <a:lstStyle/>
-          <a:p>
-            <a:pPr algn="ctr"/>
-            <a:r>
-              <a:rPr lang="en-US" sz="1050" b="1" dirty="0" err="1" smtClean="0">
-                <a:solidFill>
-                  <a:schemeClr val="accent6">
-                    <a:lumMod val="75000"/>
-                  </a:schemeClr>
-                </a:solidFill>
-              </a:rPr>
-              <a:t>XmlAdaptedPerson</a:t>
-            </a:r>
-            <a:endParaRPr lang="en-SG" sz="1050" b="1" dirty="0">
-              <a:solidFill>
-                <a:schemeClr val="accent6">
-                  <a:lumMod val="75000"/>
-                </a:schemeClr>
-              </a:solidFill>
-            </a:endParaRPr>
-          </a:p>
-        </p:txBody>
-      </p:sp>
       <p:cxnSp>
         <p:nvCxnSpPr>
-          <p:cNvPr id="77" name="Elbow Connector 122"/>
+          <p:cNvPr id="33" name="Elbow Connector 122">
+            <a:extLst>
+              <a:ext uri="{FF2B5EF4-FFF2-40B4-BE49-F238E27FC236}">
+                <a16:creationId xmlns:a16="http://schemas.microsoft.com/office/drawing/2014/main" id="{CDE5FCE6-868C-4377-B9ED-6A9C210DBD53}"/>
+              </a:ext>
+            </a:extLst>
+          </p:cNvPr>
           <p:cNvCxnSpPr>
-            <a:stCxn id="66" idx="3"/>
-            <a:endCxn id="74" idx="1"/>
+            <a:cxnSpLocks/>
           </p:cNvCxnSpPr>
           <p:nvPr/>
         </p:nvCxnSpPr>
         <p:spPr>
           <a:xfrm flipV="1">
-            <a:off x="7220507" y="3333004"/>
+            <a:off x="6900610" y="3722092"/>
             <a:ext cx="395231" cy="786"/>
           </a:xfrm>
           <a:prstGeom prst="bentConnector3">
@@ -4833,6 +5426,523 @@
           </a:fontRef>
         </p:style>
       </p:cxnSp>
+      <p:cxnSp>
+        <p:nvCxnSpPr>
+          <p:cNvPr id="4" name="Straight Arrow Connector 3">
+            <a:extLst>
+              <a:ext uri="{FF2B5EF4-FFF2-40B4-BE49-F238E27FC236}">
+                <a16:creationId xmlns:a16="http://schemas.microsoft.com/office/drawing/2014/main" id="{ABDDF4CA-3DD3-4FE3-BD1F-8822DEF8AC69}"/>
+              </a:ext>
+            </a:extLst>
+          </p:cNvPr>
+          <p:cNvCxnSpPr/>
+          <p:nvPr/>
+        </p:nvCxnSpPr>
+        <p:spPr>
+          <a:xfrm flipH="1" flipV="1">
+            <a:off x="7893888" y="2876190"/>
+            <a:ext cx="5750" cy="196250"/>
+          </a:xfrm>
+          <a:prstGeom prst="straightConnector1">
+            <a:avLst/>
+          </a:prstGeom>
+          <a:ln w="19050">
+            <a:prstDash val="sysDot"/>
+            <a:headEnd type="none" w="med" len="med"/>
+            <a:tailEnd type="arrow" w="med" len="med"/>
+          </a:ln>
+          <a:effectLst/>
+        </p:spPr>
+        <p:style>
+          <a:lnRef idx="1">
+            <a:schemeClr val="accent6"/>
+          </a:lnRef>
+          <a:fillRef idx="2">
+            <a:schemeClr val="accent6"/>
+          </a:fillRef>
+          <a:effectRef idx="1">
+            <a:schemeClr val="accent6"/>
+          </a:effectRef>
+          <a:fontRef idx="minor">
+            <a:schemeClr val="dk1"/>
+          </a:fontRef>
+        </p:style>
+      </p:cxnSp>
+      <p:cxnSp>
+        <p:nvCxnSpPr>
+          <p:cNvPr id="36" name="Straight Arrow Connector 35">
+            <a:extLst>
+              <a:ext uri="{FF2B5EF4-FFF2-40B4-BE49-F238E27FC236}">
+                <a16:creationId xmlns:a16="http://schemas.microsoft.com/office/drawing/2014/main" id="{38899B10-78D3-4919-B1B3-EE1EEA925BB3}"/>
+              </a:ext>
+            </a:extLst>
+          </p:cNvPr>
+          <p:cNvCxnSpPr>
+            <a:cxnSpLocks/>
+          </p:cNvCxnSpPr>
+          <p:nvPr/>
+        </p:nvCxnSpPr>
+        <p:spPr>
+          <a:xfrm flipH="1">
+            <a:off x="7886699" y="3852411"/>
+            <a:ext cx="5750" cy="271013"/>
+          </a:xfrm>
+          <a:prstGeom prst="straightConnector1">
+            <a:avLst/>
+          </a:prstGeom>
+          <a:ln w="19050">
+            <a:prstDash val="sysDot"/>
+            <a:headEnd type="none" w="med" len="med"/>
+            <a:tailEnd type="arrow" w="med" len="med"/>
+          </a:ln>
+          <a:effectLst/>
+        </p:spPr>
+        <p:style>
+          <a:lnRef idx="1">
+            <a:schemeClr val="accent6"/>
+          </a:lnRef>
+          <a:fillRef idx="2">
+            <a:schemeClr val="accent6"/>
+          </a:fillRef>
+          <a:effectRef idx="1">
+            <a:schemeClr val="accent6"/>
+          </a:effectRef>
+          <a:fontRef idx="minor">
+            <a:schemeClr val="dk1"/>
+          </a:fontRef>
+        </p:style>
+      </p:cxnSp>
+      <p:sp>
+        <p:nvSpPr>
+          <p:cNvPr id="37" name="Rectangle 8">
+            <a:extLst>
+              <a:ext uri="{FF2B5EF4-FFF2-40B4-BE49-F238E27FC236}">
+                <a16:creationId xmlns:a16="http://schemas.microsoft.com/office/drawing/2014/main" id="{9BCC6247-09D4-492F-9381-EF3ED4CA7E07}"/>
+              </a:ext>
+            </a:extLst>
+          </p:cNvPr>
+          <p:cNvSpPr/>
+          <p:nvPr/>
+        </p:nvSpPr>
+        <p:spPr>
+          <a:xfrm>
+            <a:off x="7180823" y="4121170"/>
+            <a:ext cx="1734168" cy="346760"/>
+          </a:xfrm>
+          <a:prstGeom prst="rect">
+            <a:avLst/>
+          </a:prstGeom>
+          <a:ln w="19050"/>
+          <a:effectLst/>
+        </p:spPr>
+        <p:style>
+          <a:lnRef idx="1">
+            <a:schemeClr val="accent6"/>
+          </a:lnRef>
+          <a:fillRef idx="2">
+            <a:schemeClr val="accent6"/>
+          </a:fillRef>
+          <a:effectRef idx="1">
+            <a:schemeClr val="accent6"/>
+          </a:effectRef>
+          <a:fontRef idx="minor">
+            <a:schemeClr val="dk1"/>
+          </a:fontRef>
+        </p:style>
+        <p:txBody>
+          <a:bodyPr rtlCol="0" anchor="ctr"/>
+          <a:lstStyle/>
+          <a:p>
+            <a:pPr algn="ctr"/>
+            <a:r>
+              <a:rPr lang="en-US" sz="1050" b="1">
+                <a:solidFill>
+                  <a:schemeClr val="accent6">
+                    <a:lumMod val="75000"/>
+                  </a:schemeClr>
+                </a:solidFill>
+              </a:rPr>
+              <a:t>XmlAdaptedDeliveryman</a:t>
+            </a:r>
+            <a:endParaRPr lang="en-US"/>
+          </a:p>
+        </p:txBody>
+      </p:sp>
+      <p:cxnSp>
+        <p:nvCxnSpPr>
+          <p:cNvPr id="38" name="Elbow Connector 63">
+            <a:extLst>
+              <a:ext uri="{FF2B5EF4-FFF2-40B4-BE49-F238E27FC236}">
+                <a16:creationId xmlns:a16="http://schemas.microsoft.com/office/drawing/2014/main" id="{C06590A8-159F-4C4A-B129-4A84B624FC6B}"/>
+              </a:ext>
+            </a:extLst>
+          </p:cNvPr>
+          <p:cNvCxnSpPr>
+            <a:cxnSpLocks/>
+          </p:cNvCxnSpPr>
+          <p:nvPr/>
+        </p:nvCxnSpPr>
+        <p:spPr>
+          <a:xfrm flipV="1">
+            <a:off x="4401635" y="4130663"/>
+            <a:ext cx="223324" cy="1"/>
+          </a:xfrm>
+          <a:prstGeom prst="bentConnector3">
+            <a:avLst>
+              <a:gd name="adj1" fmla="val 50000"/>
+            </a:avLst>
+          </a:prstGeom>
+          <a:ln w="19050">
+            <a:solidFill>
+              <a:schemeClr val="accent6">
+                <a:lumMod val="75000"/>
+              </a:schemeClr>
+            </a:solidFill>
+            <a:prstDash val="sysDot"/>
+            <a:headEnd type="none" w="med" len="med"/>
+            <a:tailEnd type="none" w="med" len="med"/>
+          </a:ln>
+          <a:effectLst/>
+        </p:spPr>
+        <p:style>
+          <a:lnRef idx="1">
+            <a:schemeClr val="accent2"/>
+          </a:lnRef>
+          <a:fillRef idx="2">
+            <a:schemeClr val="accent2"/>
+          </a:fillRef>
+          <a:effectRef idx="1">
+            <a:schemeClr val="accent2"/>
+          </a:effectRef>
+          <a:fontRef idx="minor">
+            <a:schemeClr val="dk1"/>
+          </a:fontRef>
+        </p:style>
+      </p:cxnSp>
+      <p:sp>
+        <p:nvSpPr>
+          <p:cNvPr id="39" name="Isosceles Triangle 102">
+            <a:extLst>
+              <a:ext uri="{FF2B5EF4-FFF2-40B4-BE49-F238E27FC236}">
+                <a16:creationId xmlns:a16="http://schemas.microsoft.com/office/drawing/2014/main" id="{F5D8B78D-0F72-4F43-B1B6-DBEAE8D8AA5A}"/>
+              </a:ext>
+            </a:extLst>
+          </p:cNvPr>
+          <p:cNvSpPr/>
+          <p:nvPr/>
+        </p:nvSpPr>
+        <p:spPr>
+          <a:xfrm rot="5400000" flipV="1">
+            <a:off x="4203781" y="4017742"/>
+            <a:ext cx="220184" cy="175523"/>
+          </a:xfrm>
+          <a:prstGeom prst="triangle">
+            <a:avLst/>
+          </a:prstGeom>
+          <a:solidFill>
+            <a:schemeClr val="accent6">
+              <a:lumMod val="75000"/>
+            </a:schemeClr>
+          </a:solidFill>
+          <a:ln w="19050">
+            <a:solidFill>
+              <a:schemeClr val="accent6">
+                <a:lumMod val="75000"/>
+              </a:schemeClr>
+            </a:solidFill>
+          </a:ln>
+          <a:effectLst/>
+        </p:spPr>
+        <p:style>
+          <a:lnRef idx="1">
+            <a:schemeClr val="accent2"/>
+          </a:lnRef>
+          <a:fillRef idx="2">
+            <a:schemeClr val="accent2"/>
+          </a:fillRef>
+          <a:effectRef idx="1">
+            <a:schemeClr val="accent2"/>
+          </a:effectRef>
+          <a:fontRef idx="minor">
+            <a:schemeClr val="dk1"/>
+          </a:fontRef>
+        </p:style>
+        <p:txBody>
+          <a:bodyPr rtlCol="0" anchor="ctr"/>
+          <a:lstStyle/>
+          <a:p>
+            <a:pPr algn="ctr"/>
+            <a:endParaRPr lang="en-SG" sz="1050">
+              <a:solidFill>
+                <a:schemeClr val="bg1"/>
+              </a:solidFill>
+            </a:endParaRPr>
+          </a:p>
+        </p:txBody>
+      </p:sp>
+      <p:sp>
+        <p:nvSpPr>
+          <p:cNvPr id="40" name="Rectangle 8">
+            <a:extLst>
+              <a:ext uri="{FF2B5EF4-FFF2-40B4-BE49-F238E27FC236}">
+                <a16:creationId xmlns:a16="http://schemas.microsoft.com/office/drawing/2014/main" id="{576AE358-3053-4B1D-BE33-5C5D1BA5E2D5}"/>
+              </a:ext>
+            </a:extLst>
+          </p:cNvPr>
+          <p:cNvSpPr/>
+          <p:nvPr/>
+        </p:nvSpPr>
+        <p:spPr>
+          <a:xfrm>
+            <a:off x="4621365" y="3932123"/>
+            <a:ext cx="1044035" cy="364733"/>
+          </a:xfrm>
+          <a:prstGeom prst="rect">
+            <a:avLst/>
+          </a:prstGeom>
+          <a:ln w="19050"/>
+          <a:effectLst/>
+        </p:spPr>
+        <p:style>
+          <a:lnRef idx="1">
+            <a:schemeClr val="accent6"/>
+          </a:lnRef>
+          <a:fillRef idx="2">
+            <a:schemeClr val="accent6"/>
+          </a:fillRef>
+          <a:effectRef idx="1">
+            <a:schemeClr val="accent6"/>
+          </a:effectRef>
+          <a:fontRef idx="minor">
+            <a:schemeClr val="dk1"/>
+          </a:fontRef>
+        </p:style>
+        <p:txBody>
+          <a:bodyPr rtlCol="0" anchor="ctr"/>
+          <a:lstStyle/>
+          <a:p>
+            <a:pPr algn="ctr"/>
+            <a:r>
+              <a:rPr lang="en-US" sz="1050" b="1">
+                <a:solidFill>
+                  <a:schemeClr val="accent6">
+                    <a:lumMod val="75000"/>
+                  </a:schemeClr>
+                </a:solidFill>
+              </a:rPr>
+              <a:t>XmlUsersList Storage</a:t>
+            </a:r>
+            <a:endParaRPr lang="en-US"/>
+          </a:p>
+        </p:txBody>
+      </p:sp>
+      <p:cxnSp>
+        <p:nvCxnSpPr>
+          <p:cNvPr id="41" name="Elbow Connector 122">
+            <a:extLst>
+              <a:ext uri="{FF2B5EF4-FFF2-40B4-BE49-F238E27FC236}">
+                <a16:creationId xmlns:a16="http://schemas.microsoft.com/office/drawing/2014/main" id="{9662CE0B-162C-4FA9-A6F7-5D08F1238F35}"/>
+              </a:ext>
+            </a:extLst>
+          </p:cNvPr>
+          <p:cNvCxnSpPr>
+            <a:cxnSpLocks/>
+          </p:cNvCxnSpPr>
+          <p:nvPr/>
+        </p:nvCxnSpPr>
+        <p:spPr>
+          <a:xfrm>
+            <a:off x="5651020" y="4112692"/>
+            <a:ext cx="228600" cy="1970"/>
+          </a:xfrm>
+          <a:prstGeom prst="bentConnector3">
+            <a:avLst>
+              <a:gd name="adj1" fmla="val 50000"/>
+            </a:avLst>
+          </a:prstGeom>
+          <a:ln w="19050">
+            <a:solidFill>
+              <a:schemeClr val="accent6">
+                <a:lumMod val="75000"/>
+              </a:schemeClr>
+            </a:solidFill>
+            <a:prstDash val="sysDot"/>
+            <a:headEnd type="none" w="med" len="med"/>
+            <a:tailEnd type="arrow" w="med" len="med"/>
+          </a:ln>
+          <a:effectLst/>
+        </p:spPr>
+        <p:style>
+          <a:lnRef idx="1">
+            <a:schemeClr val="accent2"/>
+          </a:lnRef>
+          <a:fillRef idx="2">
+            <a:schemeClr val="accent2"/>
+          </a:fillRef>
+          <a:effectRef idx="1">
+            <a:schemeClr val="accent2"/>
+          </a:effectRef>
+          <a:fontRef idx="minor">
+            <a:schemeClr val="dk1"/>
+          </a:fontRef>
+        </p:style>
+      </p:cxnSp>
+      <p:sp>
+        <p:nvSpPr>
+          <p:cNvPr id="43" name="Rectangle 8">
+            <a:extLst>
+              <a:ext uri="{FF2B5EF4-FFF2-40B4-BE49-F238E27FC236}">
+                <a16:creationId xmlns:a16="http://schemas.microsoft.com/office/drawing/2014/main" id="{C478C0FF-701D-481F-BD9F-C3FB74B2146F}"/>
+              </a:ext>
+            </a:extLst>
+          </p:cNvPr>
+          <p:cNvSpPr/>
+          <p:nvPr/>
+        </p:nvSpPr>
+        <p:spPr>
+          <a:xfrm>
+            <a:off x="5879620" y="3930499"/>
+            <a:ext cx="1053339" cy="371921"/>
+          </a:xfrm>
+          <a:prstGeom prst="rect">
+            <a:avLst/>
+          </a:prstGeom>
+          <a:ln w="19050"/>
+          <a:effectLst/>
+        </p:spPr>
+        <p:style>
+          <a:lnRef idx="1">
+            <a:schemeClr val="accent6"/>
+          </a:lnRef>
+          <a:fillRef idx="2">
+            <a:schemeClr val="accent6"/>
+          </a:fillRef>
+          <a:effectRef idx="1">
+            <a:schemeClr val="accent6"/>
+          </a:effectRef>
+          <a:fontRef idx="minor">
+            <a:schemeClr val="dk1"/>
+          </a:fontRef>
+        </p:style>
+        <p:txBody>
+          <a:bodyPr rtlCol="0" anchor="ctr"/>
+          <a:lstStyle/>
+          <a:p>
+            <a:pPr algn="ctr"/>
+            <a:r>
+              <a:rPr lang="en-US" sz="1050" b="1">
+                <a:solidFill>
+                  <a:schemeClr val="accent6">
+                    <a:lumMod val="75000"/>
+                  </a:schemeClr>
+                </a:solidFill>
+              </a:rPr>
+              <a:t>XmlSerializableUsersList</a:t>
+            </a:r>
+            <a:endParaRPr lang="en-US"/>
+          </a:p>
+        </p:txBody>
+      </p:sp>
+      <p:cxnSp>
+        <p:nvCxnSpPr>
+          <p:cNvPr id="44" name="Straight Arrow Connector 43">
+            <a:extLst>
+              <a:ext uri="{FF2B5EF4-FFF2-40B4-BE49-F238E27FC236}">
+                <a16:creationId xmlns:a16="http://schemas.microsoft.com/office/drawing/2014/main" id="{83D16E50-278D-4DA5-AB23-236A3FE4EF4E}"/>
+              </a:ext>
+            </a:extLst>
+          </p:cNvPr>
+          <p:cNvCxnSpPr>
+            <a:cxnSpLocks/>
+          </p:cNvCxnSpPr>
+          <p:nvPr/>
+        </p:nvCxnSpPr>
+        <p:spPr>
+          <a:xfrm flipH="1">
+            <a:off x="6395048" y="4301703"/>
+            <a:ext cx="5750" cy="271013"/>
+          </a:xfrm>
+          <a:prstGeom prst="straightConnector1">
+            <a:avLst/>
+          </a:prstGeom>
+          <a:ln w="19050">
+            <a:prstDash val="sysDot"/>
+            <a:headEnd type="none" w="med" len="med"/>
+            <a:tailEnd type="arrow" w="med" len="med"/>
+          </a:ln>
+          <a:effectLst/>
+        </p:spPr>
+        <p:style>
+          <a:lnRef idx="1">
+            <a:schemeClr val="accent6"/>
+          </a:lnRef>
+          <a:fillRef idx="2">
+            <a:schemeClr val="accent6"/>
+          </a:fillRef>
+          <a:effectRef idx="1">
+            <a:schemeClr val="accent6"/>
+          </a:effectRef>
+          <a:fontRef idx="minor">
+            <a:schemeClr val="dk1"/>
+          </a:fontRef>
+        </p:style>
+      </p:cxnSp>
+      <p:sp>
+        <p:nvSpPr>
+          <p:cNvPr id="45" name="Rectangle 8">
+            <a:extLst>
+              <a:ext uri="{FF2B5EF4-FFF2-40B4-BE49-F238E27FC236}">
+                <a16:creationId xmlns:a16="http://schemas.microsoft.com/office/drawing/2014/main" id="{B4AB59F1-1B7E-4230-A54D-3F8BEC96BD4F}"/>
+              </a:ext>
+            </a:extLst>
+          </p:cNvPr>
+          <p:cNvSpPr/>
+          <p:nvPr/>
+        </p:nvSpPr>
+        <p:spPr>
+          <a:xfrm>
+            <a:off x="5717927" y="4570462"/>
+            <a:ext cx="1335196" cy="346760"/>
+          </a:xfrm>
+          <a:prstGeom prst="rect">
+            <a:avLst/>
+          </a:prstGeom>
+          <a:ln w="19050"/>
+          <a:effectLst/>
+        </p:spPr>
+        <p:style>
+          <a:lnRef idx="1">
+            <a:schemeClr val="accent6"/>
+          </a:lnRef>
+          <a:fillRef idx="2">
+            <a:schemeClr val="accent6"/>
+          </a:fillRef>
+          <a:effectRef idx="1">
+            <a:schemeClr val="accent6"/>
+          </a:effectRef>
+          <a:fontRef idx="minor">
+            <a:schemeClr val="dk1"/>
+          </a:fontRef>
+        </p:style>
+        <p:txBody>
+          <a:bodyPr rtlCol="0" anchor="ctr"/>
+          <a:lstStyle/>
+          <a:p>
+            <a:pPr algn="ctr"/>
+            <a:r>
+              <a:rPr lang="en-US" sz="1050" b="1">
+                <a:solidFill>
+                  <a:schemeClr val="accent6">
+                    <a:lumMod val="75000"/>
+                  </a:schemeClr>
+                </a:solidFill>
+              </a:rPr>
+              <a:t>XmlAdaptedUser</a:t>
+            </a:r>
+            <a:endParaRPr lang="en-US"/>
+          </a:p>
+        </p:txBody>
+      </p:sp>
     </p:spTree>
     <p:extLst>
       <p:ext uri="{BB962C8B-B14F-4D97-AF65-F5344CB8AC3E}">
@@ -4843,13 +5953,6 @@
   <p:clrMapOvr>
     <a:masterClrMapping/>
   </p:clrMapOvr>
-  <p:timing>
-    <p:tnLst>
-      <p:par>
-        <p:cTn id="1" dur="indefinite" restart="never" nodeType="tmRoot"/>
-      </p:par>
-    </p:tnLst>
-  </p:timing>
 </p:sld>
 </file>
 

</xml_diff>